<commit_message>
fixed file names, added items to EDA
</commit_message>
<xml_diff>
--- a/Cannabis Analysis.pptx
+++ b/Cannabis Analysis.pptx
@@ -4,6 +4,9 @@
   <p:sldMasterIdLst>
     <p:sldMasterId id="2147483648" r:id="rId1"/>
   </p:sldMasterIdLst>
+  <p:notesMasterIdLst>
+    <p:notesMasterId r:id="rId18"/>
+  </p:notesMasterIdLst>
   <p:sldIdLst>
     <p:sldId id="257" r:id="rId2"/>
     <p:sldId id="258" r:id="rId3"/>
@@ -16,10 +19,11 @@
     <p:sldId id="265" r:id="rId10"/>
     <p:sldId id="266" r:id="rId11"/>
     <p:sldId id="267" r:id="rId12"/>
-    <p:sldId id="268" r:id="rId13"/>
-    <p:sldId id="269" r:id="rId14"/>
-    <p:sldId id="270" r:id="rId15"/>
-    <p:sldId id="271" r:id="rId16"/>
+    <p:sldId id="272" r:id="rId13"/>
+    <p:sldId id="268" r:id="rId14"/>
+    <p:sldId id="269" r:id="rId15"/>
+    <p:sldId id="270" r:id="rId16"/>
+    <p:sldId id="271" r:id="rId17"/>
   </p:sldIdLst>
   <p:sldSz cx="12192000" cy="6858000"/>
   <p:notesSz cx="6858000" cy="9144000"/>
@@ -2808,6 +2812,440 @@
 </dgm:styleDef>
 </file>
 
+<file path=ppt/notesMasters/notesMaster1.xml><?xml version="1.0" encoding="utf-8"?>
+<p:notesMaster xmlns:a="http://schemas.openxmlformats.org/drawingml/2006/main" xmlns:r="http://schemas.openxmlformats.org/officeDocument/2006/relationships" xmlns:p="http://schemas.openxmlformats.org/presentationml/2006/main">
+  <p:cSld>
+    <p:bg>
+      <p:bgRef idx="1001">
+        <a:schemeClr val="bg1"/>
+      </p:bgRef>
+    </p:bg>
+    <p:spTree>
+      <p:nvGrpSpPr>
+        <p:cNvPr id="1" name=""/>
+        <p:cNvGrpSpPr/>
+        <p:nvPr/>
+      </p:nvGrpSpPr>
+      <p:grpSpPr>
+        <a:xfrm>
+          <a:off x="0" y="0"/>
+          <a:ext cx="0" cy="0"/>
+          <a:chOff x="0" y="0"/>
+          <a:chExt cx="0" cy="0"/>
+        </a:xfrm>
+      </p:grpSpPr>
+      <p:sp>
+        <p:nvSpPr>
+          <p:cNvPr id="2" name="Header Placeholder 1"/>
+          <p:cNvSpPr>
+            <a:spLocks noGrp="1"/>
+          </p:cNvSpPr>
+          <p:nvPr>
+            <p:ph type="hdr" sz="quarter"/>
+          </p:nvPr>
+        </p:nvSpPr>
+        <p:spPr>
+          <a:xfrm>
+            <a:off x="0" y="0"/>
+            <a:ext cx="2971800" cy="458788"/>
+          </a:xfrm>
+          <a:prstGeom prst="rect">
+            <a:avLst/>
+          </a:prstGeom>
+        </p:spPr>
+        <p:txBody>
+          <a:bodyPr vert="horz" lIns="91440" tIns="45720" rIns="91440" bIns="45720" rtlCol="0"/>
+          <a:lstStyle>
+            <a:lvl1pPr algn="l">
+              <a:defRPr sz="1200"/>
+            </a:lvl1pPr>
+          </a:lstStyle>
+          <a:p>
+            <a:endParaRPr lang="en-IL"/>
+          </a:p>
+        </p:txBody>
+      </p:sp>
+      <p:sp>
+        <p:nvSpPr>
+          <p:cNvPr id="3" name="Date Placeholder 2"/>
+          <p:cNvSpPr>
+            <a:spLocks noGrp="1"/>
+          </p:cNvSpPr>
+          <p:nvPr>
+            <p:ph type="dt" idx="1"/>
+          </p:nvPr>
+        </p:nvSpPr>
+        <p:spPr>
+          <a:xfrm>
+            <a:off x="3884613" y="0"/>
+            <a:ext cx="2971800" cy="458788"/>
+          </a:xfrm>
+          <a:prstGeom prst="rect">
+            <a:avLst/>
+          </a:prstGeom>
+        </p:spPr>
+        <p:txBody>
+          <a:bodyPr vert="horz" lIns="91440" tIns="45720" rIns="91440" bIns="45720" rtlCol="0"/>
+          <a:lstStyle>
+            <a:lvl1pPr algn="r">
+              <a:defRPr sz="1200"/>
+            </a:lvl1pPr>
+          </a:lstStyle>
+          <a:p>
+            <a:fld id="{E3B6B7E0-806B-9945-BCC6-56DE783D1852}" type="datetimeFigureOut">
+              <a:rPr lang="en-IL" smtClean="0"/>
+              <a:t>25/06/2021</a:t>
+            </a:fld>
+            <a:endParaRPr lang="en-IL"/>
+          </a:p>
+        </p:txBody>
+      </p:sp>
+      <p:sp>
+        <p:nvSpPr>
+          <p:cNvPr id="4" name="Slide Image Placeholder 3"/>
+          <p:cNvSpPr>
+            <a:spLocks noGrp="1" noRot="1" noChangeAspect="1"/>
+          </p:cNvSpPr>
+          <p:nvPr>
+            <p:ph type="sldImg" idx="2"/>
+          </p:nvPr>
+        </p:nvSpPr>
+        <p:spPr>
+          <a:xfrm>
+            <a:off x="685800" y="1143000"/>
+            <a:ext cx="5486400" cy="3086100"/>
+          </a:xfrm>
+          <a:prstGeom prst="rect">
+            <a:avLst/>
+          </a:prstGeom>
+          <a:noFill/>
+          <a:ln w="12700">
+            <a:solidFill>
+              <a:prstClr val="black"/>
+            </a:solidFill>
+          </a:ln>
+        </p:spPr>
+        <p:txBody>
+          <a:bodyPr vert="horz" lIns="91440" tIns="45720" rIns="91440" bIns="45720" rtlCol="0" anchor="ctr"/>
+          <a:lstStyle/>
+          <a:p>
+            <a:endParaRPr lang="en-IL"/>
+          </a:p>
+        </p:txBody>
+      </p:sp>
+      <p:sp>
+        <p:nvSpPr>
+          <p:cNvPr id="5" name="Notes Placeholder 4"/>
+          <p:cNvSpPr>
+            <a:spLocks noGrp="1"/>
+          </p:cNvSpPr>
+          <p:nvPr>
+            <p:ph type="body" sz="quarter" idx="3"/>
+          </p:nvPr>
+        </p:nvSpPr>
+        <p:spPr>
+          <a:xfrm>
+            <a:off x="685800" y="4400550"/>
+            <a:ext cx="5486400" cy="3600450"/>
+          </a:xfrm>
+          <a:prstGeom prst="rect">
+            <a:avLst/>
+          </a:prstGeom>
+        </p:spPr>
+        <p:txBody>
+          <a:bodyPr vert="horz" lIns="91440" tIns="45720" rIns="91440" bIns="45720" rtlCol="0"/>
+          <a:lstStyle/>
+          <a:p>
+            <a:pPr lvl="0"/>
+            <a:r>
+              <a:rPr lang="en-US"/>
+              <a:t>Click to edit Master text styles</a:t>
+            </a:r>
+          </a:p>
+          <a:p>
+            <a:pPr lvl="1"/>
+            <a:r>
+              <a:rPr lang="en-US"/>
+              <a:t>Second level</a:t>
+            </a:r>
+          </a:p>
+          <a:p>
+            <a:pPr lvl="2"/>
+            <a:r>
+              <a:rPr lang="en-US"/>
+              <a:t>Third level</a:t>
+            </a:r>
+          </a:p>
+          <a:p>
+            <a:pPr lvl="3"/>
+            <a:r>
+              <a:rPr lang="en-US"/>
+              <a:t>Fourth level</a:t>
+            </a:r>
+          </a:p>
+          <a:p>
+            <a:pPr lvl="4"/>
+            <a:r>
+              <a:rPr lang="en-US"/>
+              <a:t>Fifth level</a:t>
+            </a:r>
+            <a:endParaRPr lang="en-IL"/>
+          </a:p>
+        </p:txBody>
+      </p:sp>
+      <p:sp>
+        <p:nvSpPr>
+          <p:cNvPr id="6" name="Footer Placeholder 5"/>
+          <p:cNvSpPr>
+            <a:spLocks noGrp="1"/>
+          </p:cNvSpPr>
+          <p:nvPr>
+            <p:ph type="ftr" sz="quarter" idx="4"/>
+          </p:nvPr>
+        </p:nvSpPr>
+        <p:spPr>
+          <a:xfrm>
+            <a:off x="0" y="8685213"/>
+            <a:ext cx="2971800" cy="458787"/>
+          </a:xfrm>
+          <a:prstGeom prst="rect">
+            <a:avLst/>
+          </a:prstGeom>
+        </p:spPr>
+        <p:txBody>
+          <a:bodyPr vert="horz" lIns="91440" tIns="45720" rIns="91440" bIns="45720" rtlCol="0" anchor="b"/>
+          <a:lstStyle>
+            <a:lvl1pPr algn="l">
+              <a:defRPr sz="1200"/>
+            </a:lvl1pPr>
+          </a:lstStyle>
+          <a:p>
+            <a:endParaRPr lang="en-IL"/>
+          </a:p>
+        </p:txBody>
+      </p:sp>
+      <p:sp>
+        <p:nvSpPr>
+          <p:cNvPr id="7" name="Slide Number Placeholder 6"/>
+          <p:cNvSpPr>
+            <a:spLocks noGrp="1"/>
+          </p:cNvSpPr>
+          <p:nvPr>
+            <p:ph type="sldNum" sz="quarter" idx="5"/>
+          </p:nvPr>
+        </p:nvSpPr>
+        <p:spPr>
+          <a:xfrm>
+            <a:off x="3884613" y="8685213"/>
+            <a:ext cx="2971800" cy="458787"/>
+          </a:xfrm>
+          <a:prstGeom prst="rect">
+            <a:avLst/>
+          </a:prstGeom>
+        </p:spPr>
+        <p:txBody>
+          <a:bodyPr vert="horz" lIns="91440" tIns="45720" rIns="91440" bIns="45720" rtlCol="0" anchor="b"/>
+          <a:lstStyle>
+            <a:lvl1pPr algn="r">
+              <a:defRPr sz="1200"/>
+            </a:lvl1pPr>
+          </a:lstStyle>
+          <a:p>
+            <a:fld id="{3073FD79-E0BE-5147-B1E9-3434CAC9370A}" type="slidenum">
+              <a:rPr lang="en-IL" smtClean="0"/>
+              <a:t>‹#›</a:t>
+            </a:fld>
+            <a:endParaRPr lang="en-IL"/>
+          </a:p>
+        </p:txBody>
+      </p:sp>
+    </p:spTree>
+    <p:extLst>
+      <p:ext uri="{BB962C8B-B14F-4D97-AF65-F5344CB8AC3E}">
+        <p14:creationId xmlns:p14="http://schemas.microsoft.com/office/powerpoint/2010/main" val="3154515571"/>
+      </p:ext>
+    </p:extLst>
+  </p:cSld>
+  <p:clrMap bg1="lt1" tx1="dk1" bg2="lt2" tx2="dk2" accent1="accent1" accent2="accent2" accent3="accent3" accent4="accent4" accent5="accent5" accent6="accent6" hlink="hlink" folHlink="folHlink"/>
+  <p:notesStyle>
+    <a:lvl1pPr marL="0" algn="l" defTabSz="914400" rtl="0" eaLnBrk="1" latinLnBrk="0" hangingPunct="1">
+      <a:defRPr sz="1200" kern="1200">
+        <a:solidFill>
+          <a:schemeClr val="tx1"/>
+        </a:solidFill>
+        <a:latin typeface="+mn-lt"/>
+        <a:ea typeface="+mn-ea"/>
+        <a:cs typeface="+mn-cs"/>
+      </a:defRPr>
+    </a:lvl1pPr>
+    <a:lvl2pPr marL="457200" algn="l" defTabSz="914400" rtl="0" eaLnBrk="1" latinLnBrk="0" hangingPunct="1">
+      <a:defRPr sz="1200" kern="1200">
+        <a:solidFill>
+          <a:schemeClr val="tx1"/>
+        </a:solidFill>
+        <a:latin typeface="+mn-lt"/>
+        <a:ea typeface="+mn-ea"/>
+        <a:cs typeface="+mn-cs"/>
+      </a:defRPr>
+    </a:lvl2pPr>
+    <a:lvl3pPr marL="914400" algn="l" defTabSz="914400" rtl="0" eaLnBrk="1" latinLnBrk="0" hangingPunct="1">
+      <a:defRPr sz="1200" kern="1200">
+        <a:solidFill>
+          <a:schemeClr val="tx1"/>
+        </a:solidFill>
+        <a:latin typeface="+mn-lt"/>
+        <a:ea typeface="+mn-ea"/>
+        <a:cs typeface="+mn-cs"/>
+      </a:defRPr>
+    </a:lvl3pPr>
+    <a:lvl4pPr marL="1371600" algn="l" defTabSz="914400" rtl="0" eaLnBrk="1" latinLnBrk="0" hangingPunct="1">
+      <a:defRPr sz="1200" kern="1200">
+        <a:solidFill>
+          <a:schemeClr val="tx1"/>
+        </a:solidFill>
+        <a:latin typeface="+mn-lt"/>
+        <a:ea typeface="+mn-ea"/>
+        <a:cs typeface="+mn-cs"/>
+      </a:defRPr>
+    </a:lvl4pPr>
+    <a:lvl5pPr marL="1828800" algn="l" defTabSz="914400" rtl="0" eaLnBrk="1" latinLnBrk="0" hangingPunct="1">
+      <a:defRPr sz="1200" kern="1200">
+        <a:solidFill>
+          <a:schemeClr val="tx1"/>
+        </a:solidFill>
+        <a:latin typeface="+mn-lt"/>
+        <a:ea typeface="+mn-ea"/>
+        <a:cs typeface="+mn-cs"/>
+      </a:defRPr>
+    </a:lvl5pPr>
+    <a:lvl6pPr marL="2286000" algn="l" defTabSz="914400" rtl="0" eaLnBrk="1" latinLnBrk="0" hangingPunct="1">
+      <a:defRPr sz="1200" kern="1200">
+        <a:solidFill>
+          <a:schemeClr val="tx1"/>
+        </a:solidFill>
+        <a:latin typeface="+mn-lt"/>
+        <a:ea typeface="+mn-ea"/>
+        <a:cs typeface="+mn-cs"/>
+      </a:defRPr>
+    </a:lvl6pPr>
+    <a:lvl7pPr marL="2743200" algn="l" defTabSz="914400" rtl="0" eaLnBrk="1" latinLnBrk="0" hangingPunct="1">
+      <a:defRPr sz="1200" kern="1200">
+        <a:solidFill>
+          <a:schemeClr val="tx1"/>
+        </a:solidFill>
+        <a:latin typeface="+mn-lt"/>
+        <a:ea typeface="+mn-ea"/>
+        <a:cs typeface="+mn-cs"/>
+      </a:defRPr>
+    </a:lvl7pPr>
+    <a:lvl8pPr marL="3200400" algn="l" defTabSz="914400" rtl="0" eaLnBrk="1" latinLnBrk="0" hangingPunct="1">
+      <a:defRPr sz="1200" kern="1200">
+        <a:solidFill>
+          <a:schemeClr val="tx1"/>
+        </a:solidFill>
+        <a:latin typeface="+mn-lt"/>
+        <a:ea typeface="+mn-ea"/>
+        <a:cs typeface="+mn-cs"/>
+      </a:defRPr>
+    </a:lvl8pPr>
+    <a:lvl9pPr marL="3657600" algn="l" defTabSz="914400" rtl="0" eaLnBrk="1" latinLnBrk="0" hangingPunct="1">
+      <a:defRPr sz="1200" kern="1200">
+        <a:solidFill>
+          <a:schemeClr val="tx1"/>
+        </a:solidFill>
+        <a:latin typeface="+mn-lt"/>
+        <a:ea typeface="+mn-ea"/>
+        <a:cs typeface="+mn-cs"/>
+      </a:defRPr>
+    </a:lvl9pPr>
+  </p:notesStyle>
+</p:notesMaster>
+</file>
+
+<file path=ppt/notesSlides/notesSlide1.xml><?xml version="1.0" encoding="utf-8"?>
+<p:notes xmlns:a="http://schemas.openxmlformats.org/drawingml/2006/main" xmlns:r="http://schemas.openxmlformats.org/officeDocument/2006/relationships" xmlns:p="http://schemas.openxmlformats.org/presentationml/2006/main">
+  <p:cSld>
+    <p:spTree>
+      <p:nvGrpSpPr>
+        <p:cNvPr id="1" name=""/>
+        <p:cNvGrpSpPr/>
+        <p:nvPr/>
+      </p:nvGrpSpPr>
+      <p:grpSpPr>
+        <a:xfrm>
+          <a:off x="0" y="0"/>
+          <a:ext cx="0" cy="0"/>
+          <a:chOff x="0" y="0"/>
+          <a:chExt cx="0" cy="0"/>
+        </a:xfrm>
+      </p:grpSpPr>
+      <p:sp>
+        <p:nvSpPr>
+          <p:cNvPr id="2" name="Slide Image Placeholder 1"/>
+          <p:cNvSpPr>
+            <a:spLocks noGrp="1" noRot="1" noChangeAspect="1"/>
+          </p:cNvSpPr>
+          <p:nvPr>
+            <p:ph type="sldImg"/>
+          </p:nvPr>
+        </p:nvSpPr>
+        <p:spPr/>
+      </p:sp>
+      <p:sp>
+        <p:nvSpPr>
+          <p:cNvPr id="3" name="Notes Placeholder 2"/>
+          <p:cNvSpPr>
+            <a:spLocks noGrp="1"/>
+          </p:cNvSpPr>
+          <p:nvPr>
+            <p:ph type="body" idx="1"/>
+          </p:nvPr>
+        </p:nvSpPr>
+        <p:spPr/>
+        <p:txBody>
+          <a:bodyPr/>
+          <a:lstStyle/>
+          <a:p>
+            <a:endParaRPr lang="en-IL" dirty="0"/>
+          </a:p>
+        </p:txBody>
+      </p:sp>
+      <p:sp>
+        <p:nvSpPr>
+          <p:cNvPr id="4" name="Slide Number Placeholder 3"/>
+          <p:cNvSpPr>
+            <a:spLocks noGrp="1"/>
+          </p:cNvSpPr>
+          <p:nvPr>
+            <p:ph type="sldNum" sz="quarter" idx="5"/>
+          </p:nvPr>
+        </p:nvSpPr>
+        <p:spPr/>
+        <p:txBody>
+          <a:bodyPr/>
+          <a:lstStyle/>
+          <a:p>
+            <a:fld id="{3073FD79-E0BE-5147-B1E9-3434CAC9370A}" type="slidenum">
+              <a:rPr lang="en-IL" smtClean="0"/>
+              <a:t>12</a:t>
+            </a:fld>
+            <a:endParaRPr lang="en-IL"/>
+          </a:p>
+        </p:txBody>
+      </p:sp>
+    </p:spTree>
+    <p:extLst>
+      <p:ext uri="{BB962C8B-B14F-4D97-AF65-F5344CB8AC3E}">
+        <p14:creationId xmlns:p14="http://schemas.microsoft.com/office/powerpoint/2010/main" val="1848609227"/>
+      </p:ext>
+    </p:extLst>
+  </p:cSld>
+  <p:clrMapOvr>
+    <a:masterClrMapping/>
+  </p:clrMapOvr>
+</p:notes>
+</file>
+
 <file path=ppt/slideLayouts/slideLayout1.xml><?xml version="1.0" encoding="utf-8"?>
 <p:sldLayout xmlns:a="http://schemas.openxmlformats.org/drawingml/2006/main" xmlns:r="http://schemas.openxmlformats.org/officeDocument/2006/relationships" xmlns:p="http://schemas.openxmlformats.org/presentationml/2006/main" type="title" preserve="1">
   <p:cSld name="Title Slide">
@@ -2957,7 +3395,7 @@
           <a:p>
             <a:fld id="{69F92D36-85D3-CE46-89D4-60137E68FEA3}" type="datetimeFigureOut">
               <a:rPr lang="en-IL" smtClean="0"/>
-              <a:t>18/06/2021</a:t>
+              <a:t>25/06/2021</a:t>
             </a:fld>
             <a:endParaRPr lang="en-IL"/>
           </a:p>
@@ -3157,7 +3595,7 @@
           <a:p>
             <a:fld id="{69F92D36-85D3-CE46-89D4-60137E68FEA3}" type="datetimeFigureOut">
               <a:rPr lang="en-IL" smtClean="0"/>
-              <a:t>18/06/2021</a:t>
+              <a:t>25/06/2021</a:t>
             </a:fld>
             <a:endParaRPr lang="en-IL"/>
           </a:p>
@@ -3367,7 +3805,7 @@
           <a:p>
             <a:fld id="{69F92D36-85D3-CE46-89D4-60137E68FEA3}" type="datetimeFigureOut">
               <a:rPr lang="en-IL" smtClean="0"/>
-              <a:t>18/06/2021</a:t>
+              <a:t>25/06/2021</a:t>
             </a:fld>
             <a:endParaRPr lang="en-IL"/>
           </a:p>
@@ -3567,7 +4005,7 @@
           <a:p>
             <a:fld id="{69F92D36-85D3-CE46-89D4-60137E68FEA3}" type="datetimeFigureOut">
               <a:rPr lang="en-IL" smtClean="0"/>
-              <a:t>18/06/2021</a:t>
+              <a:t>25/06/2021</a:t>
             </a:fld>
             <a:endParaRPr lang="en-IL"/>
           </a:p>
@@ -3843,7 +4281,7 @@
           <a:p>
             <a:fld id="{69F92D36-85D3-CE46-89D4-60137E68FEA3}" type="datetimeFigureOut">
               <a:rPr lang="en-IL" smtClean="0"/>
-              <a:t>18/06/2021</a:t>
+              <a:t>25/06/2021</a:t>
             </a:fld>
             <a:endParaRPr lang="en-IL"/>
           </a:p>
@@ -4111,7 +4549,7 @@
           <a:p>
             <a:fld id="{69F92D36-85D3-CE46-89D4-60137E68FEA3}" type="datetimeFigureOut">
               <a:rPr lang="en-IL" smtClean="0"/>
-              <a:t>18/06/2021</a:t>
+              <a:t>25/06/2021</a:t>
             </a:fld>
             <a:endParaRPr lang="en-IL"/>
           </a:p>
@@ -4526,7 +4964,7 @@
           <a:p>
             <a:fld id="{69F92D36-85D3-CE46-89D4-60137E68FEA3}" type="datetimeFigureOut">
               <a:rPr lang="en-IL" smtClean="0"/>
-              <a:t>18/06/2021</a:t>
+              <a:t>25/06/2021</a:t>
             </a:fld>
             <a:endParaRPr lang="en-IL"/>
           </a:p>
@@ -4668,7 +5106,7 @@
           <a:p>
             <a:fld id="{69F92D36-85D3-CE46-89D4-60137E68FEA3}" type="datetimeFigureOut">
               <a:rPr lang="en-IL" smtClean="0"/>
-              <a:t>18/06/2021</a:t>
+              <a:t>25/06/2021</a:t>
             </a:fld>
             <a:endParaRPr lang="en-IL"/>
           </a:p>
@@ -4781,7 +5219,7 @@
           <a:p>
             <a:fld id="{69F92D36-85D3-CE46-89D4-60137E68FEA3}" type="datetimeFigureOut">
               <a:rPr lang="en-IL" smtClean="0"/>
-              <a:t>18/06/2021</a:t>
+              <a:t>25/06/2021</a:t>
             </a:fld>
             <a:endParaRPr lang="en-IL"/>
           </a:p>
@@ -5094,7 +5532,7 @@
           <a:p>
             <a:fld id="{69F92D36-85D3-CE46-89D4-60137E68FEA3}" type="datetimeFigureOut">
               <a:rPr lang="en-IL" smtClean="0"/>
-              <a:t>18/06/2021</a:t>
+              <a:t>25/06/2021</a:t>
             </a:fld>
             <a:endParaRPr lang="en-IL"/>
           </a:p>
@@ -5383,7 +5821,7 @@
           <a:p>
             <a:fld id="{69F92D36-85D3-CE46-89D4-60137E68FEA3}" type="datetimeFigureOut">
               <a:rPr lang="en-IL" smtClean="0"/>
-              <a:t>18/06/2021</a:t>
+              <a:t>25/06/2021</a:t>
             </a:fld>
             <a:endParaRPr lang="en-IL"/>
           </a:p>
@@ -5626,7 +6064,7 @@
           <a:p>
             <a:fld id="{69F92D36-85D3-CE46-89D4-60137E68FEA3}" type="datetimeFigureOut">
               <a:rPr lang="en-IL" smtClean="0"/>
-              <a:t>18/06/2021</a:t>
+              <a:t>25/06/2021</a:t>
             </a:fld>
             <a:endParaRPr lang="en-IL"/>
           </a:p>
@@ -7905,20 +8343,90 @@
         </p:blipFill>
         <p:spPr>
           <a:xfrm>
-            <a:off x="6538878" y="1364591"/>
-            <a:ext cx="3644987" cy="2429991"/>
+            <a:off x="405246" y="2239313"/>
+            <a:ext cx="5618834" cy="3745889"/>
           </a:xfrm>
           <a:prstGeom prst="rect">
             <a:avLst/>
           </a:prstGeom>
         </p:spPr>
       </p:pic>
+      <p:sp>
+        <p:nvSpPr>
+          <p:cNvPr id="33" name="TextBox 32">
+            <a:extLst>
+              <a:ext uri="{FF2B5EF4-FFF2-40B4-BE49-F238E27FC236}">
+                <a16:creationId xmlns:a16="http://schemas.microsoft.com/office/drawing/2014/main" id="{8AB71FD3-815C-C64D-8B7A-C851875419F4}"/>
+              </a:ext>
+            </a:extLst>
+          </p:cNvPr>
+          <p:cNvSpPr txBox="1"/>
+          <p:nvPr/>
+        </p:nvSpPr>
+        <p:spPr>
+          <a:xfrm>
+            <a:off x="845511" y="1448558"/>
+            <a:ext cx="2553520" cy="477054"/>
+          </a:xfrm>
+          <a:prstGeom prst="rect">
+            <a:avLst/>
+          </a:prstGeom>
+          <a:noFill/>
+        </p:spPr>
+        <p:txBody>
+          <a:bodyPr wrap="none" rtlCol="0">
+            <a:spAutoFit/>
+          </a:bodyPr>
+          <a:lstStyle/>
+          <a:p>
+            <a:r>
+              <a:rPr lang="en-IL" sz="2500" u="sng" dirty="0"/>
+              <a:t>THC% Distribution</a:t>
+            </a:r>
+          </a:p>
+        </p:txBody>
+      </p:sp>
+      <p:sp>
+        <p:nvSpPr>
+          <p:cNvPr id="34" name="TextBox 33">
+            <a:extLst>
+              <a:ext uri="{FF2B5EF4-FFF2-40B4-BE49-F238E27FC236}">
+                <a16:creationId xmlns:a16="http://schemas.microsoft.com/office/drawing/2014/main" id="{0322D2C2-1AE1-AF49-9BFA-CEF8FE5DB71F}"/>
+              </a:ext>
+            </a:extLst>
+          </p:cNvPr>
+          <p:cNvSpPr txBox="1"/>
+          <p:nvPr/>
+        </p:nvSpPr>
+        <p:spPr>
+          <a:xfrm>
+            <a:off x="845511" y="1925612"/>
+            <a:ext cx="4090479" cy="369332"/>
+          </a:xfrm>
+          <a:prstGeom prst="rect">
+            <a:avLst/>
+          </a:prstGeom>
+          <a:noFill/>
+        </p:spPr>
+        <p:txBody>
+          <a:bodyPr wrap="none" rtlCol="0">
+            <a:spAutoFit/>
+          </a:bodyPr>
+          <a:lstStyle/>
+          <a:p>
+            <a:r>
+              <a:rPr lang="en-IL" dirty="0"/>
+              <a:t>Most of the strains contain 15 – 20 % THC</a:t>
+            </a:r>
+          </a:p>
+        </p:txBody>
+      </p:sp>
       <p:pic>
         <p:nvPicPr>
-          <p:cNvPr id="22" name="Picture 21" descr="Chart, pie chart&#10;&#10;Description automatically generated">
-            <a:extLst>
-              <a:ext uri="{FF2B5EF4-FFF2-40B4-BE49-F238E27FC236}">
-                <a16:creationId xmlns:a16="http://schemas.microsoft.com/office/drawing/2014/main" id="{0E9E4923-900F-2144-9F83-968E45F88724}"/>
+          <p:cNvPr id="4" name="Picture 3" descr="Chart, histogram&#10;&#10;Description automatically generated">
+            <a:extLst>
+              <a:ext uri="{FF2B5EF4-FFF2-40B4-BE49-F238E27FC236}">
+                <a16:creationId xmlns:a16="http://schemas.microsoft.com/office/drawing/2014/main" id="{5B3137B1-FF56-9342-A695-D29683AA64B5}"/>
               </a:ext>
             </a:extLst>
           </p:cNvPr>
@@ -7935,50 +8443,20 @@
         </p:blipFill>
         <p:spPr>
           <a:xfrm>
-            <a:off x="5374513" y="4046163"/>
-            <a:ext cx="3581399" cy="2387599"/>
+            <a:off x="6296892" y="2239312"/>
+            <a:ext cx="5618834" cy="3745889"/>
           </a:xfrm>
           <a:prstGeom prst="rect">
             <a:avLst/>
           </a:prstGeom>
         </p:spPr>
       </p:pic>
-      <p:pic>
-        <p:nvPicPr>
-          <p:cNvPr id="30" name="Picture 29" descr="Chart, pie chart&#10;&#10;Description automatically generated">
-            <a:extLst>
-              <a:ext uri="{FF2B5EF4-FFF2-40B4-BE49-F238E27FC236}">
-                <a16:creationId xmlns:a16="http://schemas.microsoft.com/office/drawing/2014/main" id="{3D5F2977-50DE-1B4C-85D6-505636617611}"/>
-              </a:ext>
-            </a:extLst>
-          </p:cNvPr>
-          <p:cNvPicPr>
-            <a:picLocks noChangeAspect="1"/>
-          </p:cNvPicPr>
-          <p:nvPr/>
-        </p:nvPicPr>
-        <p:blipFill>
-          <a:blip r:embed="rId4"/>
-          <a:stretch>
-            <a:fillRect/>
-          </a:stretch>
-        </p:blipFill>
-        <p:spPr>
-          <a:xfrm>
-            <a:off x="7915295" y="4046162"/>
-            <a:ext cx="3581399" cy="2387599"/>
-          </a:xfrm>
-          <a:prstGeom prst="rect">
-            <a:avLst/>
-          </a:prstGeom>
-        </p:spPr>
-      </p:pic>
-      <p:sp>
-        <p:nvSpPr>
-          <p:cNvPr id="33" name="TextBox 32">
-            <a:extLst>
-              <a:ext uri="{FF2B5EF4-FFF2-40B4-BE49-F238E27FC236}">
-                <a16:creationId xmlns:a16="http://schemas.microsoft.com/office/drawing/2014/main" id="{8AB71FD3-815C-C64D-8B7A-C851875419F4}"/>
+      <p:sp>
+        <p:nvSpPr>
+          <p:cNvPr id="17" name="TextBox 16">
+            <a:extLst>
+              <a:ext uri="{FF2B5EF4-FFF2-40B4-BE49-F238E27FC236}">
+                <a16:creationId xmlns:a16="http://schemas.microsoft.com/office/drawing/2014/main" id="{96A88EDD-1FA9-1740-800C-8F7CF21D38E5}"/>
               </a:ext>
             </a:extLst>
           </p:cNvPr>
@@ -7987,8 +8465,8 @@
         </p:nvSpPr>
         <p:spPr>
           <a:xfrm>
-            <a:off x="845511" y="1448558"/>
-            <a:ext cx="2553520" cy="477054"/>
+            <a:off x="6872376" y="1448558"/>
+            <a:ext cx="2569550" cy="477054"/>
           </a:xfrm>
           <a:prstGeom prst="rect">
             <a:avLst/>
@@ -8003,17 +8481,17 @@
           <a:p>
             <a:r>
               <a:rPr lang="en-IL" sz="2500" u="sng" dirty="0"/>
-              <a:t>THC% Distribution</a:t>
-            </a:r>
-          </a:p>
-        </p:txBody>
-      </p:sp>
-      <p:sp>
-        <p:nvSpPr>
-          <p:cNvPr id="34" name="TextBox 33">
-            <a:extLst>
-              <a:ext uri="{FF2B5EF4-FFF2-40B4-BE49-F238E27FC236}">
-                <a16:creationId xmlns:a16="http://schemas.microsoft.com/office/drawing/2014/main" id="{0322D2C2-1AE1-AF49-9BFA-CEF8FE5DB71F}"/>
+              <a:t>CBD% Distribution</a:t>
+            </a:r>
+          </a:p>
+        </p:txBody>
+      </p:sp>
+      <p:sp>
+        <p:nvSpPr>
+          <p:cNvPr id="18" name="TextBox 17">
+            <a:extLst>
+              <a:ext uri="{FF2B5EF4-FFF2-40B4-BE49-F238E27FC236}">
+                <a16:creationId xmlns:a16="http://schemas.microsoft.com/office/drawing/2014/main" id="{8ED0B28C-C6FC-664F-B774-3008D47D58BA}"/>
               </a:ext>
             </a:extLst>
           </p:cNvPr>
@@ -8022,8 +8500,8 @@
         </p:nvSpPr>
         <p:spPr>
           <a:xfrm>
-            <a:off x="845511" y="1925612"/>
-            <a:ext cx="4090479" cy="369332"/>
+            <a:off x="6872376" y="1925612"/>
+            <a:ext cx="5183022" cy="369332"/>
           </a:xfrm>
           <a:prstGeom prst="rect">
             <a:avLst/>
@@ -8038,147 +8516,7 @@
           <a:p>
             <a:r>
               <a:rPr lang="en-IL" dirty="0"/>
-              <a:t>Most of the strains contain 15 – 20 % THC</a:t>
-            </a:r>
-          </a:p>
-        </p:txBody>
-      </p:sp>
-      <p:sp>
-        <p:nvSpPr>
-          <p:cNvPr id="41" name="TextBox 40">
-            <a:extLst>
-              <a:ext uri="{FF2B5EF4-FFF2-40B4-BE49-F238E27FC236}">
-                <a16:creationId xmlns:a16="http://schemas.microsoft.com/office/drawing/2014/main" id="{D4E064E1-078D-A14B-B788-8BA616038666}"/>
-              </a:ext>
-            </a:extLst>
-          </p:cNvPr>
-          <p:cNvSpPr txBox="1"/>
-          <p:nvPr/>
-        </p:nvSpPr>
-        <p:spPr>
-          <a:xfrm>
-            <a:off x="858020" y="4046162"/>
-            <a:ext cx="1753685" cy="477054"/>
-          </a:xfrm>
-          <a:prstGeom prst="rect">
-            <a:avLst/>
-          </a:prstGeom>
-          <a:noFill/>
-        </p:spPr>
-        <p:txBody>
-          <a:bodyPr wrap="none" rtlCol="0">
-            <a:spAutoFit/>
-          </a:bodyPr>
-          <a:lstStyle/>
-          <a:p>
-            <a:r>
-              <a:rPr lang="en-IL" sz="2500" u="sng" dirty="0"/>
-              <a:t>Strain Types</a:t>
-            </a:r>
-          </a:p>
-        </p:txBody>
-      </p:sp>
-      <p:sp>
-        <p:nvSpPr>
-          <p:cNvPr id="42" name="TextBox 41">
-            <a:extLst>
-              <a:ext uri="{FF2B5EF4-FFF2-40B4-BE49-F238E27FC236}">
-                <a16:creationId xmlns:a16="http://schemas.microsoft.com/office/drawing/2014/main" id="{C080A2E2-BDCA-1146-AEB8-8C6E5BCEFC8A}"/>
-              </a:ext>
-            </a:extLst>
-          </p:cNvPr>
-          <p:cNvSpPr txBox="1"/>
-          <p:nvPr/>
-        </p:nvSpPr>
-        <p:spPr>
-          <a:xfrm>
-            <a:off x="858020" y="4523216"/>
-            <a:ext cx="4616328" cy="369332"/>
-          </a:xfrm>
-          <a:prstGeom prst="rect">
-            <a:avLst/>
-          </a:prstGeom>
-          <a:noFill/>
-        </p:spPr>
-        <p:txBody>
-          <a:bodyPr wrap="none" rtlCol="0">
-            <a:spAutoFit/>
-          </a:bodyPr>
-          <a:lstStyle/>
-          <a:p>
-            <a:r>
-              <a:rPr lang="en-IL" dirty="0"/>
-              <a:t>More than 50% of our data are “Hybrid” strains</a:t>
-            </a:r>
-          </a:p>
-        </p:txBody>
-      </p:sp>
-      <p:sp>
-        <p:nvSpPr>
-          <p:cNvPr id="43" name="TextBox 42">
-            <a:extLst>
-              <a:ext uri="{FF2B5EF4-FFF2-40B4-BE49-F238E27FC236}">
-                <a16:creationId xmlns:a16="http://schemas.microsoft.com/office/drawing/2014/main" id="{6CD3BDA3-CB29-1E45-B8B8-D807C1EB93A7}"/>
-              </a:ext>
-            </a:extLst>
-          </p:cNvPr>
-          <p:cNvSpPr txBox="1"/>
-          <p:nvPr/>
-        </p:nvSpPr>
-        <p:spPr>
-          <a:xfrm>
-            <a:off x="845511" y="5076604"/>
-            <a:ext cx="3371436" cy="477054"/>
-          </a:xfrm>
-          <a:prstGeom prst="rect">
-            <a:avLst/>
-          </a:prstGeom>
-          <a:noFill/>
-        </p:spPr>
-        <p:txBody>
-          <a:bodyPr wrap="none" rtlCol="0">
-            <a:spAutoFit/>
-          </a:bodyPr>
-          <a:lstStyle/>
-          <a:p>
-            <a:r>
-              <a:rPr lang="en-IL" sz="2500" u="sng" dirty="0"/>
-              <a:t>Most Common Terpenes</a:t>
-            </a:r>
-          </a:p>
-        </p:txBody>
-      </p:sp>
-      <p:sp>
-        <p:nvSpPr>
-          <p:cNvPr id="44" name="TextBox 43">
-            <a:extLst>
-              <a:ext uri="{FF2B5EF4-FFF2-40B4-BE49-F238E27FC236}">
-                <a16:creationId xmlns:a16="http://schemas.microsoft.com/office/drawing/2014/main" id="{3838845F-4A08-5148-9AC7-D2A8878DACEA}"/>
-              </a:ext>
-            </a:extLst>
-          </p:cNvPr>
-          <p:cNvSpPr txBox="1"/>
-          <p:nvPr/>
-        </p:nvSpPr>
-        <p:spPr>
-          <a:xfrm>
-            <a:off x="845511" y="5553658"/>
-            <a:ext cx="4616328" cy="369332"/>
-          </a:xfrm>
-          <a:prstGeom prst="rect">
-            <a:avLst/>
-          </a:prstGeom>
-          <a:noFill/>
-        </p:spPr>
-        <p:txBody>
-          <a:bodyPr wrap="none" rtlCol="0">
-            <a:spAutoFit/>
-          </a:bodyPr>
-          <a:lstStyle/>
-          <a:p>
-            <a:r>
-              <a:rPr lang="en-IL" dirty="0"/>
-              <a:t>More than 50% of our data are “Hybrid” strains</a:t>
+              <a:t>Unlike THC, most of the CBD % values are under 2.5%</a:t>
             </a:r>
           </a:p>
         </p:txBody>
@@ -8536,47 +8874,17 @@
                   <a:srgbClr val="FFFFFF"/>
                 </a:solidFill>
               </a:rPr>
-              <a:t>EDA – Strain Rating</a:t>
+              <a:t>EDA – Strain Data</a:t>
             </a:r>
           </a:p>
         </p:txBody>
       </p:sp>
       <p:pic>
         <p:nvPicPr>
-          <p:cNvPr id="28" name="Picture 27" descr="Chart&#10;&#10;Description automatically generated">
-            <a:extLst>
-              <a:ext uri="{FF2B5EF4-FFF2-40B4-BE49-F238E27FC236}">
-                <a16:creationId xmlns:a16="http://schemas.microsoft.com/office/drawing/2014/main" id="{6378D805-2F84-0F4B-9D20-FA9119D7E738}"/>
-              </a:ext>
-            </a:extLst>
-          </p:cNvPr>
-          <p:cNvPicPr>
-            <a:picLocks noChangeAspect="1"/>
-          </p:cNvPicPr>
-          <p:nvPr/>
-        </p:nvPicPr>
-        <p:blipFill>
-          <a:blip r:embed="rId2"/>
-          <a:stretch>
-            <a:fillRect/>
-          </a:stretch>
-        </p:blipFill>
-        <p:spPr>
-          <a:xfrm>
-            <a:off x="6262312" y="3774051"/>
-            <a:ext cx="4340878" cy="2893919"/>
-          </a:xfrm>
-          <a:prstGeom prst="rect">
-            <a:avLst/>
-          </a:prstGeom>
-        </p:spPr>
-      </p:pic>
-      <p:pic>
-        <p:nvPicPr>
-          <p:cNvPr id="7" name="Picture 6" descr="Chart&#10;&#10;Description automatically generated">
-            <a:extLst>
-              <a:ext uri="{FF2B5EF4-FFF2-40B4-BE49-F238E27FC236}">
-                <a16:creationId xmlns:a16="http://schemas.microsoft.com/office/drawing/2014/main" id="{1E3279ED-889E-2F44-BEA8-DA514C2DD320}"/>
+          <p:cNvPr id="22" name="Picture 21" descr="Chart, pie chart&#10;&#10;Description automatically generated">
+            <a:extLst>
+              <a:ext uri="{FF2B5EF4-FFF2-40B4-BE49-F238E27FC236}">
+                <a16:creationId xmlns:a16="http://schemas.microsoft.com/office/drawing/2014/main" id="{0E9E4923-900F-2144-9F83-968E45F88724}"/>
               </a:ext>
             </a:extLst>
           </p:cNvPr>
@@ -8593,20 +8901,50 @@
         </p:blipFill>
         <p:spPr>
           <a:xfrm>
-            <a:off x="1103592" y="3749148"/>
-            <a:ext cx="4378233" cy="2918822"/>
+            <a:off x="837561" y="1913682"/>
+            <a:ext cx="3581399" cy="2387599"/>
           </a:xfrm>
           <a:prstGeom prst="rect">
             <a:avLst/>
           </a:prstGeom>
         </p:spPr>
       </p:pic>
-      <p:sp>
-        <p:nvSpPr>
-          <p:cNvPr id="17" name="TextBox 16">
-            <a:extLst>
-              <a:ext uri="{FF2B5EF4-FFF2-40B4-BE49-F238E27FC236}">
-                <a16:creationId xmlns:a16="http://schemas.microsoft.com/office/drawing/2014/main" id="{F53B61FD-9E80-AB45-90A1-11825F898E05}"/>
+      <p:pic>
+        <p:nvPicPr>
+          <p:cNvPr id="30" name="Picture 29" descr="Chart, pie chart&#10;&#10;Description automatically generated">
+            <a:extLst>
+              <a:ext uri="{FF2B5EF4-FFF2-40B4-BE49-F238E27FC236}">
+                <a16:creationId xmlns:a16="http://schemas.microsoft.com/office/drawing/2014/main" id="{3D5F2977-50DE-1B4C-85D6-505636617611}"/>
+              </a:ext>
+            </a:extLst>
+          </p:cNvPr>
+          <p:cNvPicPr>
+            <a:picLocks noChangeAspect="1"/>
+          </p:cNvPicPr>
+          <p:nvPr/>
+        </p:nvPicPr>
+        <p:blipFill>
+          <a:blip r:embed="rId4"/>
+          <a:stretch>
+            <a:fillRect/>
+          </a:stretch>
+        </p:blipFill>
+        <p:spPr>
+          <a:xfrm>
+            <a:off x="5633010" y="1949467"/>
+            <a:ext cx="3581399" cy="2387599"/>
+          </a:xfrm>
+          <a:prstGeom prst="rect">
+            <a:avLst/>
+          </a:prstGeom>
+        </p:spPr>
+      </p:pic>
+      <p:sp>
+        <p:nvSpPr>
+          <p:cNvPr id="41" name="TextBox 40">
+            <a:extLst>
+              <a:ext uri="{FF2B5EF4-FFF2-40B4-BE49-F238E27FC236}">
+                <a16:creationId xmlns:a16="http://schemas.microsoft.com/office/drawing/2014/main" id="{D4E064E1-078D-A14B-B788-8BA616038666}"/>
               </a:ext>
             </a:extLst>
           </p:cNvPr>
@@ -8615,8 +8953,8 @@
         </p:nvSpPr>
         <p:spPr>
           <a:xfrm>
-            <a:off x="860440" y="1328380"/>
-            <a:ext cx="2432269" cy="477054"/>
+            <a:off x="870017" y="1192073"/>
+            <a:ext cx="1753685" cy="477054"/>
           </a:xfrm>
           <a:prstGeom prst="rect">
             <a:avLst/>
@@ -8631,17 +8969,17 @@
           <a:p>
             <a:r>
               <a:rPr lang="en-IL" sz="2500" u="sng" dirty="0"/>
-              <a:t>Top Rated Strains</a:t>
-            </a:r>
-          </a:p>
-        </p:txBody>
-      </p:sp>
-      <p:sp>
-        <p:nvSpPr>
-          <p:cNvPr id="18" name="TextBox 17">
-            <a:extLst>
-              <a:ext uri="{FF2B5EF4-FFF2-40B4-BE49-F238E27FC236}">
-                <a16:creationId xmlns:a16="http://schemas.microsoft.com/office/drawing/2014/main" id="{D4EEBBFF-6A0D-DD4A-A189-B26D1451CC02}"/>
+              <a:t>Strain Types</a:t>
+            </a:r>
+          </a:p>
+        </p:txBody>
+      </p:sp>
+      <p:sp>
+        <p:nvSpPr>
+          <p:cNvPr id="42" name="TextBox 41">
+            <a:extLst>
+              <a:ext uri="{FF2B5EF4-FFF2-40B4-BE49-F238E27FC236}">
+                <a16:creationId xmlns:a16="http://schemas.microsoft.com/office/drawing/2014/main" id="{C080A2E2-BDCA-1146-AEB8-8C6E5BCEFC8A}"/>
               </a:ext>
             </a:extLst>
           </p:cNvPr>
@@ -8650,8 +8988,8 @@
         </p:nvSpPr>
         <p:spPr>
           <a:xfrm>
-            <a:off x="860440" y="1805434"/>
-            <a:ext cx="5790752" cy="369332"/>
+            <a:off x="870017" y="1669127"/>
+            <a:ext cx="4616328" cy="369332"/>
           </a:xfrm>
           <a:prstGeom prst="rect">
             <a:avLst/>
@@ -8666,17 +9004,17 @@
           <a:p>
             <a:r>
               <a:rPr lang="en-IL" dirty="0"/>
-              <a:t>The calculation is (Rating * Rating Users) / Max Rating Users</a:t>
-            </a:r>
-          </a:p>
-        </p:txBody>
-      </p:sp>
-      <p:sp>
-        <p:nvSpPr>
-          <p:cNvPr id="19" name="TextBox 18">
-            <a:extLst>
-              <a:ext uri="{FF2B5EF4-FFF2-40B4-BE49-F238E27FC236}">
-                <a16:creationId xmlns:a16="http://schemas.microsoft.com/office/drawing/2014/main" id="{F830FEE2-5355-1847-9F58-38DD55AC1CC4}"/>
+              <a:t>More than 50% of our data are “Hybrid” strains</a:t>
+            </a:r>
+          </a:p>
+        </p:txBody>
+      </p:sp>
+      <p:sp>
+        <p:nvSpPr>
+          <p:cNvPr id="43" name="TextBox 42">
+            <a:extLst>
+              <a:ext uri="{FF2B5EF4-FFF2-40B4-BE49-F238E27FC236}">
+                <a16:creationId xmlns:a16="http://schemas.microsoft.com/office/drawing/2014/main" id="{6CD3BDA3-CB29-1E45-B8B8-D807C1EB93A7}"/>
               </a:ext>
             </a:extLst>
           </p:cNvPr>
@@ -8685,8 +9023,8 @@
         </p:nvSpPr>
         <p:spPr>
           <a:xfrm>
-            <a:off x="860440" y="2287427"/>
-            <a:ext cx="2296141" cy="477054"/>
+            <a:off x="5769037" y="1182237"/>
+            <a:ext cx="3371436" cy="477054"/>
           </a:xfrm>
           <a:prstGeom prst="rect">
             <a:avLst/>
@@ -8701,17 +9039,17 @@
           <a:p>
             <a:r>
               <a:rPr lang="en-IL" sz="2500" u="sng" dirty="0"/>
-              <a:t>Rating by THC %</a:t>
-            </a:r>
-          </a:p>
-        </p:txBody>
-      </p:sp>
-      <p:sp>
-        <p:nvSpPr>
-          <p:cNvPr id="20" name="TextBox 19">
-            <a:extLst>
-              <a:ext uri="{FF2B5EF4-FFF2-40B4-BE49-F238E27FC236}">
-                <a16:creationId xmlns:a16="http://schemas.microsoft.com/office/drawing/2014/main" id="{509C1D13-3CDB-1043-AC0E-25A32C580976}"/>
+              <a:t>Most Common Terpenes</a:t>
+            </a:r>
+          </a:p>
+        </p:txBody>
+      </p:sp>
+      <p:sp>
+        <p:nvSpPr>
+          <p:cNvPr id="44" name="TextBox 43">
+            <a:extLst>
+              <a:ext uri="{FF2B5EF4-FFF2-40B4-BE49-F238E27FC236}">
+                <a16:creationId xmlns:a16="http://schemas.microsoft.com/office/drawing/2014/main" id="{3838845F-4A08-5148-9AC7-D2A8878DACEA}"/>
               </a:ext>
             </a:extLst>
           </p:cNvPr>
@@ -8720,8 +9058,8 @@
         </p:nvSpPr>
         <p:spPr>
           <a:xfrm>
-            <a:off x="860440" y="2764481"/>
-            <a:ext cx="5158720" cy="923330"/>
+            <a:off x="5769037" y="1659291"/>
+            <a:ext cx="3814699" cy="369332"/>
           </a:xfrm>
           <a:prstGeom prst="rect">
             <a:avLst/>
@@ -8736,27 +9074,161 @@
           <a:p>
             <a:r>
               <a:rPr lang="en-IL" dirty="0"/>
-              <a:t>Strains with under 15% THC usually have high rating. </a:t>
-            </a:r>
-          </a:p>
+              <a:t>The most common terpene is Myrcene</a:t>
+            </a:r>
+          </a:p>
+        </p:txBody>
+      </p:sp>
+      <p:pic>
+        <p:nvPicPr>
+          <p:cNvPr id="21" name="Picture 20" descr="Chart, pie chart&#10;&#10;Description automatically generated">
+            <a:extLst>
+              <a:ext uri="{FF2B5EF4-FFF2-40B4-BE49-F238E27FC236}">
+                <a16:creationId xmlns:a16="http://schemas.microsoft.com/office/drawing/2014/main" id="{29376A88-E520-BA40-A9E1-7F8D46FBD150}"/>
+              </a:ext>
+            </a:extLst>
+          </p:cNvPr>
+          <p:cNvPicPr>
+            <a:picLocks noChangeAspect="1"/>
+          </p:cNvPicPr>
+          <p:nvPr/>
+        </p:nvPicPr>
+        <p:blipFill>
+          <a:blip r:embed="rId5"/>
+          <a:stretch>
+            <a:fillRect/>
+          </a:stretch>
+        </p:blipFill>
+        <p:spPr>
+          <a:xfrm>
+            <a:off x="5710489" y="4336860"/>
+            <a:ext cx="3488531" cy="2325687"/>
+          </a:xfrm>
+          <a:prstGeom prst="rect">
+            <a:avLst/>
+          </a:prstGeom>
+        </p:spPr>
+      </p:pic>
+      <p:sp>
+        <p:nvSpPr>
+          <p:cNvPr id="23" name="TextBox 22">
+            <a:extLst>
+              <a:ext uri="{FF2B5EF4-FFF2-40B4-BE49-F238E27FC236}">
+                <a16:creationId xmlns:a16="http://schemas.microsoft.com/office/drawing/2014/main" id="{04E45AB1-9C1F-9F47-9BD3-993C73185563}"/>
+              </a:ext>
+            </a:extLst>
+          </p:cNvPr>
+          <p:cNvSpPr txBox="1"/>
+          <p:nvPr/>
+        </p:nvSpPr>
+        <p:spPr>
+          <a:xfrm>
+            <a:off x="837560" y="4102139"/>
+            <a:ext cx="5508752" cy="477054"/>
+          </a:xfrm>
+          <a:prstGeom prst="rect">
+            <a:avLst/>
+          </a:prstGeom>
+          <a:noFill/>
+        </p:spPr>
+        <p:txBody>
+          <a:bodyPr wrap="none" rtlCol="0">
+            <a:spAutoFit/>
+          </a:bodyPr>
+          <a:lstStyle/>
+          <a:p>
+            <a:r>
+              <a:rPr lang="en-IL" sz="2500" u="sng" dirty="0"/>
+              <a:t>Top 3 Flavors / Feelings – Strain Type Dist</a:t>
+            </a:r>
+          </a:p>
+        </p:txBody>
+      </p:sp>
+      <p:sp>
+        <p:nvSpPr>
+          <p:cNvPr id="24" name="TextBox 23">
+            <a:extLst>
+              <a:ext uri="{FF2B5EF4-FFF2-40B4-BE49-F238E27FC236}">
+                <a16:creationId xmlns:a16="http://schemas.microsoft.com/office/drawing/2014/main" id="{0C43F06B-9D05-114A-BF4C-5F8EF5D66D14}"/>
+              </a:ext>
+            </a:extLst>
+          </p:cNvPr>
+          <p:cNvSpPr txBox="1"/>
+          <p:nvPr/>
+        </p:nvSpPr>
+        <p:spPr>
+          <a:xfrm>
+            <a:off x="833002" y="4503206"/>
+            <a:ext cx="5987473" cy="923330"/>
+          </a:xfrm>
+          <a:prstGeom prst="rect">
+            <a:avLst/>
+          </a:prstGeom>
+          <a:noFill/>
+        </p:spPr>
+        <p:txBody>
+          <a:bodyPr wrap="none" rtlCol="0">
+            <a:spAutoFit/>
+          </a:bodyPr>
+          <a:lstStyle/>
           <a:p>
             <a:r>
               <a:rPr lang="en-IL" dirty="0"/>
-              <a:t>At around 15% we can see lower rating.</a:t>
-            </a:r>
-          </a:p>
-          <a:p>
+              <a:t>The ratio between the types remains the same, which shows</a:t>
+            </a:r>
+          </a:p>
+          <a:p>
+            <a:r>
+              <a:rPr lang="en-US" dirty="0"/>
+              <a:t>T</a:t>
+            </a:r>
             <a:r>
               <a:rPr lang="en-IL" dirty="0"/>
-              <a:t>Over 15% the amount of low ratings is decreasing.</a:t>
-            </a:r>
-          </a:p>
-        </p:txBody>
-      </p:sp>
+              <a:t>hat all types share the same top flavors.</a:t>
+            </a:r>
+          </a:p>
+          <a:p>
+            <a:r>
+              <a:rPr lang="en-IL" dirty="0"/>
+              <a:t>The same happens for ”Top 3 Feelings”</a:t>
+            </a:r>
+          </a:p>
+        </p:txBody>
+      </p:sp>
+      <p:pic>
+        <p:nvPicPr>
+          <p:cNvPr id="10" name="Picture 9" descr="Chart, pie chart&#10;&#10;Description automatically generated">
+            <a:extLst>
+              <a:ext uri="{FF2B5EF4-FFF2-40B4-BE49-F238E27FC236}">
+                <a16:creationId xmlns:a16="http://schemas.microsoft.com/office/drawing/2014/main" id="{780E76E9-6AD3-BA47-A616-4F8CC81BD122}"/>
+              </a:ext>
+            </a:extLst>
+          </p:cNvPr>
+          <p:cNvPicPr>
+            <a:picLocks noChangeAspect="1"/>
+          </p:cNvPicPr>
+          <p:nvPr/>
+        </p:nvPicPr>
+        <p:blipFill>
+          <a:blip r:embed="rId6"/>
+          <a:stretch>
+            <a:fillRect/>
+          </a:stretch>
+        </p:blipFill>
+        <p:spPr>
+          <a:xfrm>
+            <a:off x="8149765" y="4306380"/>
+            <a:ext cx="3604815" cy="2403210"/>
+          </a:xfrm>
+          <a:prstGeom prst="rect">
+            <a:avLst/>
+          </a:prstGeom>
+        </p:spPr>
+      </p:pic>
     </p:spTree>
     <p:extLst>
       <p:ext uri="{BB962C8B-B14F-4D97-AF65-F5344CB8AC3E}">
-        <p14:creationId xmlns:p14="http://schemas.microsoft.com/office/powerpoint/2010/main" val="490792630"/>
+        <p14:creationId xmlns:p14="http://schemas.microsoft.com/office/powerpoint/2010/main" val="3763180488"/>
       </p:ext>
     </p:extLst>
   </p:cSld>
@@ -9106,161 +9578,410 @@
                   <a:srgbClr val="FFFFFF"/>
                 </a:solidFill>
               </a:rPr>
-              <a:t>Machine Learning</a:t>
-            </a:r>
-          </a:p>
-        </p:txBody>
-      </p:sp>
-      <p:sp>
-        <p:nvSpPr>
-          <p:cNvPr id="3" name="Content Placeholder 2">
-            <a:extLst>
-              <a:ext uri="{FF2B5EF4-FFF2-40B4-BE49-F238E27FC236}">
-                <a16:creationId xmlns:a16="http://schemas.microsoft.com/office/drawing/2014/main" id="{BA080928-EC02-ED41-A9A8-B9C716E1803F}"/>
+              <a:t>EDA – Strain Rating</a:t>
+            </a:r>
+          </a:p>
+        </p:txBody>
+      </p:sp>
+      <p:pic>
+        <p:nvPicPr>
+          <p:cNvPr id="28" name="Picture 27" descr="Chart&#10;&#10;Description automatically generated">
+            <a:extLst>
+              <a:ext uri="{FF2B5EF4-FFF2-40B4-BE49-F238E27FC236}">
+                <a16:creationId xmlns:a16="http://schemas.microsoft.com/office/drawing/2014/main" id="{6378D805-2F84-0F4B-9D20-FA9119D7E738}"/>
+              </a:ext>
+            </a:extLst>
+          </p:cNvPr>
+          <p:cNvPicPr>
+            <a:picLocks noChangeAspect="1"/>
+          </p:cNvPicPr>
+          <p:nvPr/>
+        </p:nvPicPr>
+        <p:blipFill>
+          <a:blip r:embed="rId2"/>
+          <a:stretch>
+            <a:fillRect/>
+          </a:stretch>
+        </p:blipFill>
+        <p:spPr>
+          <a:xfrm>
+            <a:off x="5797374" y="2018603"/>
+            <a:ext cx="3871981" cy="2581321"/>
+          </a:xfrm>
+          <a:prstGeom prst="rect">
+            <a:avLst/>
+          </a:prstGeom>
+        </p:spPr>
+      </p:pic>
+      <p:pic>
+        <p:nvPicPr>
+          <p:cNvPr id="7" name="Picture 6" descr="Chart&#10;&#10;Description automatically generated">
+            <a:extLst>
+              <a:ext uri="{FF2B5EF4-FFF2-40B4-BE49-F238E27FC236}">
+                <a16:creationId xmlns:a16="http://schemas.microsoft.com/office/drawing/2014/main" id="{1E3279ED-889E-2F44-BEA8-DA514C2DD320}"/>
+              </a:ext>
+            </a:extLst>
+          </p:cNvPr>
+          <p:cNvPicPr>
+            <a:picLocks noChangeAspect="1"/>
+          </p:cNvPicPr>
+          <p:nvPr/>
+        </p:nvPicPr>
+        <p:blipFill>
+          <a:blip r:embed="rId3"/>
+          <a:stretch>
+            <a:fillRect/>
+          </a:stretch>
+        </p:blipFill>
+        <p:spPr>
+          <a:xfrm>
+            <a:off x="399952" y="3204477"/>
+            <a:ext cx="4378233" cy="2918822"/>
+          </a:xfrm>
+          <a:prstGeom prst="rect">
+            <a:avLst/>
+          </a:prstGeom>
+        </p:spPr>
+      </p:pic>
+      <p:sp>
+        <p:nvSpPr>
+          <p:cNvPr id="17" name="TextBox 16">
+            <a:extLst>
+              <a:ext uri="{FF2B5EF4-FFF2-40B4-BE49-F238E27FC236}">
+                <a16:creationId xmlns:a16="http://schemas.microsoft.com/office/drawing/2014/main" id="{F53B61FD-9E80-AB45-90A1-11825F898E05}"/>
+              </a:ext>
+            </a:extLst>
+          </p:cNvPr>
+          <p:cNvSpPr txBox="1"/>
+          <p:nvPr/>
+        </p:nvSpPr>
+        <p:spPr>
+          <a:xfrm>
+            <a:off x="841385" y="1541549"/>
+            <a:ext cx="2432269" cy="477054"/>
+          </a:xfrm>
+          <a:prstGeom prst="rect">
+            <a:avLst/>
+          </a:prstGeom>
+          <a:noFill/>
+        </p:spPr>
+        <p:txBody>
+          <a:bodyPr wrap="none" rtlCol="0">
+            <a:spAutoFit/>
+          </a:bodyPr>
+          <a:lstStyle/>
+          <a:p>
+            <a:r>
+              <a:rPr lang="en-IL" sz="2500" u="sng" dirty="0"/>
+              <a:t>Top Rated Strains</a:t>
+            </a:r>
+          </a:p>
+        </p:txBody>
+      </p:sp>
+      <p:sp>
+        <p:nvSpPr>
+          <p:cNvPr id="18" name="TextBox 17">
+            <a:extLst>
+              <a:ext uri="{FF2B5EF4-FFF2-40B4-BE49-F238E27FC236}">
+                <a16:creationId xmlns:a16="http://schemas.microsoft.com/office/drawing/2014/main" id="{D4EEBBFF-6A0D-DD4A-A189-B26D1451CC02}"/>
+              </a:ext>
+            </a:extLst>
+          </p:cNvPr>
+          <p:cNvSpPr txBox="1"/>
+          <p:nvPr/>
+        </p:nvSpPr>
+        <p:spPr>
+          <a:xfrm>
+            <a:off x="841385" y="2018603"/>
+            <a:ext cx="4126066" cy="646331"/>
+          </a:xfrm>
+          <a:prstGeom prst="rect">
+            <a:avLst/>
+          </a:prstGeom>
+          <a:noFill/>
+        </p:spPr>
+        <p:txBody>
+          <a:bodyPr wrap="none" rtlCol="0">
+            <a:spAutoFit/>
+          </a:bodyPr>
+          <a:lstStyle/>
+          <a:p>
+            <a:r>
+              <a:rPr lang="en-IL" dirty="0"/>
+              <a:t>The calculation is:</a:t>
+            </a:r>
+          </a:p>
+          <a:p>
+            <a:r>
+              <a:rPr lang="en-IL" dirty="0"/>
+              <a:t>(Rating * Rating Users) / Max Rating Users</a:t>
+            </a:r>
+          </a:p>
+        </p:txBody>
+      </p:sp>
+      <p:sp>
+        <p:nvSpPr>
+          <p:cNvPr id="19" name="TextBox 18">
+            <a:extLst>
+              <a:ext uri="{FF2B5EF4-FFF2-40B4-BE49-F238E27FC236}">
+                <a16:creationId xmlns:a16="http://schemas.microsoft.com/office/drawing/2014/main" id="{F830FEE2-5355-1847-9F58-38DD55AC1CC4}"/>
+              </a:ext>
+            </a:extLst>
+          </p:cNvPr>
+          <p:cNvSpPr txBox="1"/>
+          <p:nvPr/>
+        </p:nvSpPr>
+        <p:spPr>
+          <a:xfrm>
+            <a:off x="6089190" y="523800"/>
+            <a:ext cx="2296141" cy="477054"/>
+          </a:xfrm>
+          <a:prstGeom prst="rect">
+            <a:avLst/>
+          </a:prstGeom>
+          <a:noFill/>
+        </p:spPr>
+        <p:txBody>
+          <a:bodyPr wrap="none" rtlCol="0">
+            <a:spAutoFit/>
+          </a:bodyPr>
+          <a:lstStyle/>
+          <a:p>
+            <a:r>
+              <a:rPr lang="en-IL" sz="2500" u="sng" dirty="0"/>
+              <a:t>Rating by THC %</a:t>
+            </a:r>
+          </a:p>
+        </p:txBody>
+      </p:sp>
+      <p:sp>
+        <p:nvSpPr>
+          <p:cNvPr id="20" name="TextBox 19">
+            <a:extLst>
+              <a:ext uri="{FF2B5EF4-FFF2-40B4-BE49-F238E27FC236}">
+                <a16:creationId xmlns:a16="http://schemas.microsoft.com/office/drawing/2014/main" id="{509C1D13-3CDB-1043-AC0E-25A32C580976}"/>
+              </a:ext>
+            </a:extLst>
+          </p:cNvPr>
+          <p:cNvSpPr txBox="1"/>
+          <p:nvPr/>
+        </p:nvSpPr>
+        <p:spPr>
+          <a:xfrm>
+            <a:off x="6089190" y="1000854"/>
+            <a:ext cx="5158720" cy="1200329"/>
+          </a:xfrm>
+          <a:prstGeom prst="rect">
+            <a:avLst/>
+          </a:prstGeom>
+          <a:noFill/>
+        </p:spPr>
+        <p:txBody>
+          <a:bodyPr wrap="none" rtlCol="0">
+            <a:spAutoFit/>
+          </a:bodyPr>
+          <a:lstStyle/>
+          <a:p>
+            <a:r>
+              <a:rPr lang="en-IL" dirty="0"/>
+              <a:t>Strains with under 15% THC usually have high rating. </a:t>
+            </a:r>
+          </a:p>
+          <a:p>
+            <a:r>
+              <a:rPr lang="en-IL" dirty="0"/>
+              <a:t>At around 15% we can see lower rating.</a:t>
+            </a:r>
+          </a:p>
+          <a:p>
+            <a:r>
+              <a:rPr lang="en-IL" dirty="0"/>
+              <a:t>Over 15% the amount of low ratings is decreasing.</a:t>
+            </a:r>
+          </a:p>
+          <a:p>
+            <a:r>
+              <a:rPr lang="en-IL" dirty="0"/>
+              <a:t>We can see some outliers, so they were cleaned.</a:t>
+            </a:r>
+          </a:p>
+        </p:txBody>
+      </p:sp>
+      <p:pic>
+        <p:nvPicPr>
+          <p:cNvPr id="4" name="Picture 3" descr="A screenshot of a computer&#10;&#10;Description automatically generated with medium confidence">
+            <a:extLst>
+              <a:ext uri="{FF2B5EF4-FFF2-40B4-BE49-F238E27FC236}">
+                <a16:creationId xmlns:a16="http://schemas.microsoft.com/office/drawing/2014/main" id="{C15DA457-DA22-1E4D-9BC1-794069E70DCF}"/>
+              </a:ext>
+            </a:extLst>
+          </p:cNvPr>
+          <p:cNvPicPr>
+            <a:picLocks noChangeAspect="1"/>
+          </p:cNvPicPr>
+          <p:nvPr/>
+        </p:nvPicPr>
+        <p:blipFill>
+          <a:blip r:embed="rId4"/>
+          <a:stretch>
+            <a:fillRect/>
+          </a:stretch>
+        </p:blipFill>
+        <p:spPr>
+          <a:xfrm>
+            <a:off x="8517966" y="4276679"/>
+            <a:ext cx="3871981" cy="2581321"/>
+          </a:xfrm>
+          <a:prstGeom prst="rect">
+            <a:avLst/>
+          </a:prstGeom>
+        </p:spPr>
+      </p:pic>
+      <p:sp>
+        <p:nvSpPr>
+          <p:cNvPr id="5" name="TextBox 4">
+            <a:extLst>
+              <a:ext uri="{FF2B5EF4-FFF2-40B4-BE49-F238E27FC236}">
+                <a16:creationId xmlns:a16="http://schemas.microsoft.com/office/drawing/2014/main" id="{5EF85276-B471-ED45-91A1-3AB0182501B4}"/>
+              </a:ext>
+            </a:extLst>
+          </p:cNvPr>
+          <p:cNvSpPr txBox="1"/>
+          <p:nvPr/>
+        </p:nvSpPr>
+        <p:spPr>
+          <a:xfrm>
+            <a:off x="8341977" y="3920269"/>
+            <a:ext cx="950901" cy="369332"/>
+          </a:xfrm>
+          <a:prstGeom prst="rect">
+            <a:avLst/>
+          </a:prstGeom>
+          <a:noFill/>
+        </p:spPr>
+        <p:txBody>
+          <a:bodyPr wrap="none" rtlCol="0">
+            <a:spAutoFit/>
+          </a:bodyPr>
+          <a:lstStyle/>
+          <a:p>
+            <a:r>
+              <a:rPr lang="en-IL" dirty="0"/>
+              <a:t>Pre-EDA</a:t>
+            </a:r>
+          </a:p>
+        </p:txBody>
+      </p:sp>
+      <p:sp>
+        <p:nvSpPr>
+          <p:cNvPr id="21" name="TextBox 20">
+            <a:extLst>
+              <a:ext uri="{FF2B5EF4-FFF2-40B4-BE49-F238E27FC236}">
+                <a16:creationId xmlns:a16="http://schemas.microsoft.com/office/drawing/2014/main" id="{80EE4609-524C-7B41-BEAF-3627BBFE2524}"/>
+              </a:ext>
+            </a:extLst>
+          </p:cNvPr>
+          <p:cNvSpPr txBox="1"/>
+          <p:nvPr/>
+        </p:nvSpPr>
+        <p:spPr>
+          <a:xfrm>
+            <a:off x="9057063" y="6123299"/>
+            <a:ext cx="1032590" cy="369332"/>
+          </a:xfrm>
+          <a:prstGeom prst="rect">
+            <a:avLst/>
+          </a:prstGeom>
+          <a:noFill/>
+        </p:spPr>
+        <p:txBody>
+          <a:bodyPr wrap="none" rtlCol="0">
+            <a:spAutoFit/>
+          </a:bodyPr>
+          <a:lstStyle/>
+          <a:p>
+            <a:r>
+              <a:rPr lang="en-IL" dirty="0"/>
+              <a:t>Post-EDA</a:t>
+            </a:r>
+          </a:p>
+        </p:txBody>
+      </p:sp>
+    </p:spTree>
+    <p:extLst>
+      <p:ext uri="{BB962C8B-B14F-4D97-AF65-F5344CB8AC3E}">
+        <p14:creationId xmlns:p14="http://schemas.microsoft.com/office/powerpoint/2010/main" val="490792630"/>
+      </p:ext>
+    </p:extLst>
+  </p:cSld>
+  <p:clrMapOvr>
+    <a:overrideClrMapping bg1="dk1" tx1="lt1" bg2="dk2" tx2="lt2" accent1="accent1" accent2="accent2" accent3="accent3" accent4="accent4" accent5="accent5" accent6="accent6" hlink="hlink" folHlink="folHlink"/>
+  </p:clrMapOvr>
+</p:sld>
+</file>
+
+<file path=ppt/slides/slide14.xml><?xml version="1.0" encoding="utf-8"?>
+<p:sld xmlns:a="http://schemas.openxmlformats.org/drawingml/2006/main" xmlns:r="http://schemas.openxmlformats.org/officeDocument/2006/relationships" xmlns:p="http://schemas.openxmlformats.org/presentationml/2006/main">
+  <p:cSld>
+    <p:bg>
+      <p:bgPr>
+        <a:solidFill>
+          <a:srgbClr val="404040"/>
+        </a:solidFill>
+        <a:effectLst/>
+      </p:bgPr>
+    </p:bg>
+    <p:spTree>
+      <p:nvGrpSpPr>
+        <p:cNvPr id="1" name=""/>
+        <p:cNvGrpSpPr/>
+        <p:nvPr/>
+      </p:nvGrpSpPr>
+      <p:grpSpPr>
+        <a:xfrm>
+          <a:off x="0" y="0"/>
+          <a:ext cx="0" cy="0"/>
+          <a:chOff x="0" y="0"/>
+          <a:chExt cx="0" cy="0"/>
+        </a:xfrm>
+      </p:grpSpPr>
+      <p:sp>
+        <p:nvSpPr>
+          <p:cNvPr id="14" name="Rectangle 7">
+            <a:extLst>
+              <a:ext uri="{FF2B5EF4-FFF2-40B4-BE49-F238E27FC236}">
+                <a16:creationId xmlns:a16="http://schemas.microsoft.com/office/drawing/2014/main" id="{EA67B5B4-3A24-436E-B663-1B2EBFF8A0CD}"/>
+              </a:ext>
+              <a:ext uri="{C183D7F6-B498-43B3-948B-1728B52AA6E4}">
+                <adec:decorative xmlns:adec="http://schemas.microsoft.com/office/drawing/2017/decorative" val="1"/>
               </a:ext>
             </a:extLst>
           </p:cNvPr>
           <p:cNvSpPr>
-            <a:spLocks noGrp="1"/>
+            <a:spLocks noGrp="1" noRot="1" noChangeAspect="1" noMove="1" noResize="1" noEditPoints="1" noAdjustHandles="1" noChangeArrowheads="1" noChangeShapeType="1" noTextEdit="1"/>
           </p:cNvSpPr>
           <p:nvPr>
-            <p:ph idx="1"/>
+            <p:extLst>
+              <p:ext uri="{386F3935-93C4-4BCD-93E2-E3B085C9AB24}">
+                <p16:designElem xmlns:p16="http://schemas.microsoft.com/office/powerpoint/2015/main" val="1"/>
+              </p:ext>
+            </p:extLst>
           </p:nvPr>
         </p:nvSpPr>
         <p:spPr>
           <a:xfrm>
-            <a:off x="838201" y="1406523"/>
-            <a:ext cx="10515598" cy="4154361"/>
-          </a:xfrm>
-        </p:spPr>
-        <p:txBody>
-          <a:bodyPr>
-            <a:normAutofit/>
-          </a:bodyPr>
-          <a:lstStyle/>
-          <a:p>
-            <a:pPr marL="0" indent="0">
-              <a:buNone/>
-            </a:pPr>
-            <a:r>
-              <a:rPr lang="en-IL" sz="2500" u="sng" dirty="0">
-                <a:solidFill>
-                  <a:srgbClr val="FFFFFF"/>
-                </a:solidFill>
-              </a:rPr>
-              <a:t>The Goal</a:t>
-            </a:r>
-          </a:p>
-          <a:p>
-            <a:pPr marL="0" indent="0">
-              <a:buNone/>
-            </a:pPr>
-            <a:r>
-              <a:rPr lang="en-IL" sz="1800" dirty="0">
-                <a:solidFill>
-                  <a:srgbClr val="FFFFFF"/>
-                </a:solidFill>
-              </a:rPr>
-              <a:t>Create a model that can predict whether a strain is “Hybrid”, “Sativa” or “Indica”.</a:t>
-            </a:r>
-          </a:p>
-          <a:p>
-            <a:pPr marL="0" indent="0">
-              <a:buNone/>
-            </a:pPr>
-            <a:endParaRPr lang="en-IL" sz="1800" dirty="0">
-              <a:solidFill>
-                <a:srgbClr val="FFFFFF"/>
-              </a:solidFill>
-            </a:endParaRPr>
-          </a:p>
-          <a:p>
-            <a:pPr marL="0" indent="0">
-              <a:buNone/>
-            </a:pPr>
-            <a:r>
-              <a:rPr lang="en-IL" sz="1800" u="sng" dirty="0">
-                <a:solidFill>
-                  <a:srgbClr val="FFFFFF"/>
-                </a:solidFill>
-              </a:rPr>
-              <a:t>The Method</a:t>
-            </a:r>
-          </a:p>
-          <a:p>
-            <a:pPr marL="0" indent="0">
-              <a:buNone/>
-            </a:pPr>
-            <a:r>
-              <a:rPr lang="en-IL" sz="1800" dirty="0">
-                <a:solidFill>
-                  <a:srgbClr val="FFFFFF"/>
-                </a:solidFill>
-              </a:rPr>
-              <a:t>We used ‘sklearn’ library and Logistic Regression method to train and predict the strain type.</a:t>
-            </a:r>
-          </a:p>
-          <a:p>
-            <a:pPr marL="0" indent="0">
-              <a:buNone/>
-            </a:pPr>
-            <a:r>
-              <a:rPr lang="en-IL" sz="1800" dirty="0">
-                <a:solidFill>
-                  <a:srgbClr val="FFFFFF"/>
-                </a:solidFill>
-              </a:rPr>
-              <a:t>The reason we chose Logistic Regression is that our type of predicition is a </a:t>
-            </a:r>
-            <a:r>
-              <a:rPr lang="en-US" sz="1800" dirty="0">
-                <a:solidFill>
-                  <a:srgbClr val="FFFFFF"/>
-                </a:solidFill>
-              </a:rPr>
-              <a:t>classification problem.</a:t>
-            </a:r>
-            <a:endParaRPr lang="en-IL" sz="1800" dirty="0">
-              <a:solidFill>
-                <a:srgbClr val="FFFFFF"/>
-              </a:solidFill>
-            </a:endParaRPr>
-          </a:p>
-          <a:p>
-            <a:pPr marL="0" indent="0">
-              <a:buNone/>
-            </a:pPr>
-            <a:endParaRPr lang="en-IL" sz="1800" dirty="0">
-              <a:solidFill>
-                <a:srgbClr val="FFFFFF"/>
-              </a:solidFill>
-            </a:endParaRPr>
-          </a:p>
-        </p:txBody>
-      </p:sp>
-      <p:sp>
-        <p:nvSpPr>
-          <p:cNvPr id="4" name="Rounded Rectangle 3">
-            <a:extLst>
-              <a:ext uri="{FF2B5EF4-FFF2-40B4-BE49-F238E27FC236}">
-                <a16:creationId xmlns:a16="http://schemas.microsoft.com/office/drawing/2014/main" id="{2E0B6723-2158-5E44-813B-BA76DB25D7E2}"/>
-              </a:ext>
-            </a:extLst>
-          </p:cNvPr>
-          <p:cNvSpPr/>
-          <p:nvPr/>
-        </p:nvSpPr>
-        <p:spPr>
-          <a:xfrm>
-            <a:off x="4618827" y="4567132"/>
-            <a:ext cx="1834816" cy="1642310"/>
-          </a:xfrm>
-          <a:prstGeom prst="roundRect">
+            <a:off x="0" y="-3324"/>
+            <a:ext cx="12192000" cy="6861324"/>
+          </a:xfrm>
+          <a:prstGeom prst="rect">
             <a:avLst/>
           </a:prstGeom>
           <a:solidFill>
-            <a:srgbClr val="00D938"/>
+            <a:srgbClr val="404040"/>
           </a:solidFill>
+          <a:ln>
+            <a:noFill/>
+          </a:ln>
         </p:spPr>
         <p:style>
           <a:lnRef idx="2">
@@ -9283,38 +10004,92 @@
           <a:lstStyle/>
           <a:p>
             <a:pPr algn="ctr"/>
-            <a:r>
-              <a:rPr lang="en-IL" dirty="0"/>
-              <a:t>Logistic Regression</a:t>
-            </a:r>
-          </a:p>
-        </p:txBody>
-      </p:sp>
-      <p:sp>
-        <p:nvSpPr>
-          <p:cNvPr id="5" name="Right Arrow 4">
-            <a:extLst>
-              <a:ext uri="{FF2B5EF4-FFF2-40B4-BE49-F238E27FC236}">
-                <a16:creationId xmlns:a16="http://schemas.microsoft.com/office/drawing/2014/main" id="{A181332A-450F-1542-9875-C28E7569D14D}"/>
-              </a:ext>
-            </a:extLst>
-          </p:cNvPr>
-          <p:cNvSpPr/>
-          <p:nvPr/>
-        </p:nvSpPr>
-        <p:spPr>
-          <a:xfrm>
-            <a:off x="3022211" y="4765932"/>
-            <a:ext cx="1530456" cy="242225"/>
-          </a:xfrm>
-          <a:prstGeom prst="rightArrow">
+            <a:endParaRPr lang="en-US"/>
+          </a:p>
+        </p:txBody>
+      </p:sp>
+      <p:sp>
+        <p:nvSpPr>
+          <p:cNvPr id="15" name="Freeform 13">
+            <a:extLst>
+              <a:ext uri="{FF2B5EF4-FFF2-40B4-BE49-F238E27FC236}">
+                <a16:creationId xmlns:a16="http://schemas.microsoft.com/office/drawing/2014/main" id="{987FDF89-C993-41F4-A1B8-DBAFF16008A9}"/>
+              </a:ext>
+              <a:ext uri="{C183D7F6-B498-43B3-948B-1728B52AA6E4}">
+                <adec:decorative xmlns:adec="http://schemas.microsoft.com/office/drawing/2017/decorative" val="1"/>
+              </a:ext>
+            </a:extLst>
+          </p:cNvPr>
+          <p:cNvSpPr>
+            <a:spLocks noGrp="1" noRot="1" noChangeAspect="1" noMove="1" noResize="1" noEditPoints="1" noAdjustHandles="1" noChangeArrowheads="1" noChangeShapeType="1" noTextEdit="1"/>
+          </p:cNvSpPr>
+          <p:nvPr>
+            <p:extLst>
+              <p:ext uri="{386F3935-93C4-4BCD-93E2-E3B085C9AB24}">
+                <p16:designElem xmlns:p16="http://schemas.microsoft.com/office/powerpoint/2015/main" val="1"/>
+              </p:ext>
+            </p:extLst>
+          </p:nvPr>
+        </p:nvSpPr>
+        <p:spPr>
+          <a:xfrm>
+            <a:off x="0" y="0"/>
+            <a:ext cx="11786754" cy="6858000"/>
+          </a:xfrm>
+          <a:custGeom>
             <a:avLst/>
-          </a:prstGeom>
+            <a:gdLst>
+              <a:gd name="connsiteX0" fmla="*/ 0 w 11786754"/>
+              <a:gd name="connsiteY0" fmla="*/ 0 h 6858000"/>
+              <a:gd name="connsiteX1" fmla="*/ 8610600 w 11786754"/>
+              <a:gd name="connsiteY1" fmla="*/ 0 h 6858000"/>
+              <a:gd name="connsiteX2" fmla="*/ 11786754 w 11786754"/>
+              <a:gd name="connsiteY2" fmla="*/ 6858000 h 6858000"/>
+              <a:gd name="connsiteX3" fmla="*/ 0 w 11786754"/>
+              <a:gd name="connsiteY3" fmla="*/ 6858000 h 6858000"/>
+            </a:gdLst>
+            <a:ahLst/>
+            <a:cxnLst>
+              <a:cxn ang="0">
+                <a:pos x="connsiteX0" y="connsiteY0"/>
+              </a:cxn>
+              <a:cxn ang="0">
+                <a:pos x="connsiteX1" y="connsiteY1"/>
+              </a:cxn>
+              <a:cxn ang="0">
+                <a:pos x="connsiteX2" y="connsiteY2"/>
+              </a:cxn>
+              <a:cxn ang="0">
+                <a:pos x="connsiteX3" y="connsiteY3"/>
+              </a:cxn>
+            </a:cxnLst>
+            <a:rect l="l" t="t" r="r" b="b"/>
+            <a:pathLst>
+              <a:path w="11786754" h="6858000">
+                <a:moveTo>
+                  <a:pt x="0" y="0"/>
+                </a:moveTo>
+                <a:lnTo>
+                  <a:pt x="8610600" y="0"/>
+                </a:lnTo>
+                <a:lnTo>
+                  <a:pt x="11786754" y="6858000"/>
+                </a:lnTo>
+                <a:lnTo>
+                  <a:pt x="0" y="6858000"/>
+                </a:lnTo>
+                <a:close/>
+              </a:path>
+            </a:pathLst>
+          </a:custGeom>
           <a:solidFill>
-            <a:schemeClr val="tx1">
-              <a:lumMod val="50000"/>
-            </a:schemeClr>
+            <a:srgbClr val="000000">
+              <a:alpha val="29804"/>
+            </a:srgbClr>
           </a:solidFill>
+          <a:ln>
+            <a:noFill/>
+          </a:ln>
         </p:spPr>
         <p:style>
           <a:lnRef idx="2">
@@ -9337,38 +10112,92 @@
           <a:lstStyle/>
           <a:p>
             <a:pPr algn="ctr"/>
-            <a:r>
-              <a:rPr lang="en-IL" sz="1000" dirty="0"/>
-              <a:t>Feelings</a:t>
-            </a:r>
-          </a:p>
-        </p:txBody>
-      </p:sp>
-      <p:sp>
-        <p:nvSpPr>
-          <p:cNvPr id="10" name="Right Arrow 9">
-            <a:extLst>
-              <a:ext uri="{FF2B5EF4-FFF2-40B4-BE49-F238E27FC236}">
-                <a16:creationId xmlns:a16="http://schemas.microsoft.com/office/drawing/2014/main" id="{511C89C4-CD92-5F4B-90AB-86079802D699}"/>
-              </a:ext>
-            </a:extLst>
-          </p:cNvPr>
-          <p:cNvSpPr/>
-          <p:nvPr/>
-        </p:nvSpPr>
-        <p:spPr>
-          <a:xfrm>
-            <a:off x="3022211" y="5755042"/>
-            <a:ext cx="1530456" cy="242225"/>
-          </a:xfrm>
-          <a:prstGeom prst="rightArrow">
+            <a:endParaRPr lang="en-US"/>
+          </a:p>
+        </p:txBody>
+      </p:sp>
+      <p:sp>
+        <p:nvSpPr>
+          <p:cNvPr id="16" name="Freeform 11">
+            <a:extLst>
+              <a:ext uri="{FF2B5EF4-FFF2-40B4-BE49-F238E27FC236}">
+                <a16:creationId xmlns:a16="http://schemas.microsoft.com/office/drawing/2014/main" id="{64E585EA-75FD-4025-8270-F66A58A15CDA}"/>
+              </a:ext>
+              <a:ext uri="{C183D7F6-B498-43B3-948B-1728B52AA6E4}">
+                <adec:decorative xmlns:adec="http://schemas.microsoft.com/office/drawing/2017/decorative" val="1"/>
+              </a:ext>
+            </a:extLst>
+          </p:cNvPr>
+          <p:cNvSpPr>
+            <a:spLocks noGrp="1" noRot="1" noChangeAspect="1" noMove="1" noResize="1" noEditPoints="1" noAdjustHandles="1" noChangeArrowheads="1" noChangeShapeType="1" noTextEdit="1"/>
+          </p:cNvSpPr>
+          <p:nvPr>
+            <p:extLst>
+              <p:ext uri="{386F3935-93C4-4BCD-93E2-E3B085C9AB24}">
+                <p16:designElem xmlns:p16="http://schemas.microsoft.com/office/powerpoint/2015/main" val="1"/>
+              </p:ext>
+            </p:extLst>
+          </p:nvPr>
+        </p:nvSpPr>
+        <p:spPr>
+          <a:xfrm>
+            <a:off x="0" y="0"/>
+            <a:ext cx="3581400" cy="6858000"/>
+          </a:xfrm>
+          <a:custGeom>
             <a:avLst/>
-          </a:prstGeom>
+            <a:gdLst>
+              <a:gd name="connsiteX0" fmla="*/ 0 w 3581400"/>
+              <a:gd name="connsiteY0" fmla="*/ 0 h 6858000"/>
+              <a:gd name="connsiteX1" fmla="*/ 405246 w 3581400"/>
+              <a:gd name="connsiteY1" fmla="*/ 0 h 6858000"/>
+              <a:gd name="connsiteX2" fmla="*/ 3581400 w 3581400"/>
+              <a:gd name="connsiteY2" fmla="*/ 6858000 h 6858000"/>
+              <a:gd name="connsiteX3" fmla="*/ 0 w 3581400"/>
+              <a:gd name="connsiteY3" fmla="*/ 6858000 h 6858000"/>
+            </a:gdLst>
+            <a:ahLst/>
+            <a:cxnLst>
+              <a:cxn ang="0">
+                <a:pos x="connsiteX0" y="connsiteY0"/>
+              </a:cxn>
+              <a:cxn ang="0">
+                <a:pos x="connsiteX1" y="connsiteY1"/>
+              </a:cxn>
+              <a:cxn ang="0">
+                <a:pos x="connsiteX2" y="connsiteY2"/>
+              </a:cxn>
+              <a:cxn ang="0">
+                <a:pos x="connsiteX3" y="connsiteY3"/>
+              </a:cxn>
+            </a:cxnLst>
+            <a:rect l="l" t="t" r="r" b="b"/>
+            <a:pathLst>
+              <a:path w="3581400" h="6858000">
+                <a:moveTo>
+                  <a:pt x="0" y="0"/>
+                </a:moveTo>
+                <a:lnTo>
+                  <a:pt x="405246" y="0"/>
+                </a:lnTo>
+                <a:lnTo>
+                  <a:pt x="3581400" y="6858000"/>
+                </a:lnTo>
+                <a:lnTo>
+                  <a:pt x="0" y="6858000"/>
+                </a:lnTo>
+                <a:close/>
+              </a:path>
+            </a:pathLst>
+          </a:custGeom>
           <a:solidFill>
-            <a:schemeClr val="tx1">
-              <a:lumMod val="50000"/>
-            </a:schemeClr>
+            <a:srgbClr val="000000">
+              <a:alpha val="29804"/>
+            </a:srgbClr>
           </a:solidFill>
+          <a:ln>
+            <a:noFill/>
+          </a:ln>
         </p:spPr>
         <p:style>
           <a:lnRef idx="2">
@@ -9387,23 +10216,188 @@
           </a:fontRef>
         </p:style>
         <p:txBody>
-          <a:bodyPr rtlCol="0" anchor="ctr"/>
+          <a:bodyPr wrap="square" rtlCol="0" anchor="ctr">
+            <a:noAutofit/>
+          </a:bodyPr>
           <a:lstStyle/>
           <a:p>
             <a:pPr algn="ctr"/>
-            <a:r>
-              <a:rPr lang="en-IL" sz="1000" dirty="0"/>
-              <a:t>Flavors</a:t>
-            </a:r>
-          </a:p>
-        </p:txBody>
-      </p:sp>
-      <p:sp>
-        <p:nvSpPr>
-          <p:cNvPr id="11" name="Right Arrow 10">
-            <a:extLst>
-              <a:ext uri="{FF2B5EF4-FFF2-40B4-BE49-F238E27FC236}">
-                <a16:creationId xmlns:a16="http://schemas.microsoft.com/office/drawing/2014/main" id="{51BD266D-FC42-2D4E-AFF9-61FDF41879D3}"/>
+            <a:endParaRPr lang="en-US"/>
+          </a:p>
+        </p:txBody>
+      </p:sp>
+      <p:sp>
+        <p:nvSpPr>
+          <p:cNvPr id="2" name="Title 1">
+            <a:extLst>
+              <a:ext uri="{FF2B5EF4-FFF2-40B4-BE49-F238E27FC236}">
+                <a16:creationId xmlns:a16="http://schemas.microsoft.com/office/drawing/2014/main" id="{CE660CB5-F295-8346-9CC7-56C1F7F2060C}"/>
+              </a:ext>
+            </a:extLst>
+          </p:cNvPr>
+          <p:cNvSpPr>
+            <a:spLocks noGrp="1"/>
+          </p:cNvSpPr>
+          <p:nvPr>
+            <p:ph type="title"/>
+          </p:nvPr>
+        </p:nvSpPr>
+        <p:spPr>
+          <a:xfrm>
+            <a:off x="833002" y="190030"/>
+            <a:ext cx="10520702" cy="1325563"/>
+          </a:xfrm>
+        </p:spPr>
+        <p:txBody>
+          <a:bodyPr>
+            <a:normAutofit/>
+          </a:bodyPr>
+          <a:lstStyle/>
+          <a:p>
+            <a:r>
+              <a:rPr lang="en-IL" dirty="0">
+                <a:solidFill>
+                  <a:srgbClr val="FFFFFF"/>
+                </a:solidFill>
+              </a:rPr>
+              <a:t>Machine Learning</a:t>
+            </a:r>
+          </a:p>
+        </p:txBody>
+      </p:sp>
+      <p:sp>
+        <p:nvSpPr>
+          <p:cNvPr id="3" name="Content Placeholder 2">
+            <a:extLst>
+              <a:ext uri="{FF2B5EF4-FFF2-40B4-BE49-F238E27FC236}">
+                <a16:creationId xmlns:a16="http://schemas.microsoft.com/office/drawing/2014/main" id="{BA080928-EC02-ED41-A9A8-B9C716E1803F}"/>
+              </a:ext>
+            </a:extLst>
+          </p:cNvPr>
+          <p:cNvSpPr>
+            <a:spLocks noGrp="1"/>
+          </p:cNvSpPr>
+          <p:nvPr>
+            <p:ph idx="1"/>
+          </p:nvPr>
+        </p:nvSpPr>
+        <p:spPr>
+          <a:xfrm>
+            <a:off x="838201" y="1406523"/>
+            <a:ext cx="10515598" cy="4154361"/>
+          </a:xfrm>
+        </p:spPr>
+        <p:txBody>
+          <a:bodyPr>
+            <a:normAutofit/>
+          </a:bodyPr>
+          <a:lstStyle/>
+          <a:p>
+            <a:pPr marL="0" indent="0">
+              <a:buNone/>
+            </a:pPr>
+            <a:r>
+              <a:rPr lang="en-IL" sz="2500" u="sng" dirty="0">
+                <a:solidFill>
+                  <a:srgbClr val="FFFFFF"/>
+                </a:solidFill>
+              </a:rPr>
+              <a:t>The Goal</a:t>
+            </a:r>
+          </a:p>
+          <a:p>
+            <a:pPr marL="0" indent="0">
+              <a:buNone/>
+            </a:pPr>
+            <a:r>
+              <a:rPr lang="en-IL" sz="1800" dirty="0">
+                <a:solidFill>
+                  <a:srgbClr val="FFFFFF"/>
+                </a:solidFill>
+              </a:rPr>
+              <a:t>Create a model that can predict whether a strain is “Hybrid”, “Sativa” or “Indica”.</a:t>
+            </a:r>
+          </a:p>
+          <a:p>
+            <a:pPr marL="0" indent="0">
+              <a:buNone/>
+            </a:pPr>
+            <a:endParaRPr lang="en-IL" sz="1800" dirty="0">
+              <a:solidFill>
+                <a:srgbClr val="FFFFFF"/>
+              </a:solidFill>
+            </a:endParaRPr>
+          </a:p>
+          <a:p>
+            <a:pPr marL="0" indent="0">
+              <a:buNone/>
+            </a:pPr>
+            <a:r>
+              <a:rPr lang="en-IL" sz="2500" u="sng" dirty="0">
+                <a:solidFill>
+                  <a:srgbClr val="FFFFFF"/>
+                </a:solidFill>
+              </a:rPr>
+              <a:t>The Method</a:t>
+            </a:r>
+          </a:p>
+          <a:p>
+            <a:pPr marL="0" indent="0">
+              <a:buNone/>
+            </a:pPr>
+            <a:r>
+              <a:rPr lang="en-IL" sz="1800" dirty="0">
+                <a:solidFill>
+                  <a:srgbClr val="FFFFFF"/>
+                </a:solidFill>
+              </a:rPr>
+              <a:t>We used ‘sklearn’ library and Logistic Regression method to train and predict the strain type.</a:t>
+            </a:r>
+          </a:p>
+          <a:p>
+            <a:pPr marL="0" indent="0">
+              <a:buNone/>
+            </a:pPr>
+            <a:r>
+              <a:rPr lang="en-IL" sz="1800" dirty="0">
+                <a:solidFill>
+                  <a:srgbClr val="FFFFFF"/>
+                </a:solidFill>
+              </a:rPr>
+              <a:t>The reason we chose Logistic Regression is that our type of predicition is a </a:t>
+            </a:r>
+            <a:r>
+              <a:rPr lang="en-US" sz="1800" dirty="0">
+                <a:solidFill>
+                  <a:srgbClr val="FFFFFF"/>
+                </a:solidFill>
+              </a:rPr>
+              <a:t>classification problem.</a:t>
+            </a:r>
+            <a:endParaRPr lang="en-IL" sz="1800" dirty="0">
+              <a:solidFill>
+                <a:srgbClr val="FFFFFF"/>
+              </a:solidFill>
+            </a:endParaRPr>
+          </a:p>
+          <a:p>
+            <a:pPr marL="0" indent="0">
+              <a:buNone/>
+            </a:pPr>
+            <a:endParaRPr lang="en-IL" sz="1800" dirty="0">
+              <a:solidFill>
+                <a:srgbClr val="FFFFFF"/>
+              </a:solidFill>
+            </a:endParaRPr>
+          </a:p>
+        </p:txBody>
+      </p:sp>
+      <p:sp>
+        <p:nvSpPr>
+          <p:cNvPr id="4" name="Rounded Rectangle 3">
+            <a:extLst>
+              <a:ext uri="{FF2B5EF4-FFF2-40B4-BE49-F238E27FC236}">
+                <a16:creationId xmlns:a16="http://schemas.microsoft.com/office/drawing/2014/main" id="{2E0B6723-2158-5E44-813B-BA76DB25D7E2}"/>
               </a:ext>
             </a:extLst>
           </p:cNvPr>
@@ -9412,16 +10406,14 @@
         </p:nvSpPr>
         <p:spPr>
           <a:xfrm>
-            <a:off x="3022211" y="5414489"/>
-            <a:ext cx="1530456" cy="242225"/>
-          </a:xfrm>
-          <a:prstGeom prst="rightArrow">
+            <a:off x="4618827" y="4567132"/>
+            <a:ext cx="1834816" cy="1642310"/>
+          </a:xfrm>
+          <a:prstGeom prst="roundRect">
             <a:avLst/>
           </a:prstGeom>
           <a:solidFill>
-            <a:schemeClr val="tx1">
-              <a:lumMod val="50000"/>
-            </a:schemeClr>
+            <a:srgbClr val="00D938"/>
           </a:solidFill>
         </p:spPr>
         <p:style>
@@ -9446,18 +10438,18 @@
           <a:p>
             <a:pPr algn="ctr"/>
             <a:r>
-              <a:rPr lang="en-IL" sz="1000" dirty="0"/>
-              <a:t>THC %</a:t>
-            </a:r>
-          </a:p>
-        </p:txBody>
-      </p:sp>
-      <p:sp>
-        <p:nvSpPr>
-          <p:cNvPr id="12" name="Right Arrow 11">
-            <a:extLst>
-              <a:ext uri="{FF2B5EF4-FFF2-40B4-BE49-F238E27FC236}">
-                <a16:creationId xmlns:a16="http://schemas.microsoft.com/office/drawing/2014/main" id="{02173687-FB0B-5640-AC14-5F44C3F173AE}"/>
+              <a:rPr lang="en-IL" dirty="0"/>
+              <a:t>Logistic Regression</a:t>
+            </a:r>
+          </a:p>
+        </p:txBody>
+      </p:sp>
+      <p:sp>
+        <p:nvSpPr>
+          <p:cNvPr id="5" name="Right Arrow 4">
+            <a:extLst>
+              <a:ext uri="{FF2B5EF4-FFF2-40B4-BE49-F238E27FC236}">
+                <a16:creationId xmlns:a16="http://schemas.microsoft.com/office/drawing/2014/main" id="{A181332A-450F-1542-9875-C28E7569D14D}"/>
               </a:ext>
             </a:extLst>
           </p:cNvPr>
@@ -9466,7 +10458,7 @@
         </p:nvSpPr>
         <p:spPr>
           <a:xfrm>
-            <a:off x="3029481" y="5092106"/>
+            <a:off x="3022211" y="4765932"/>
             <a:ext cx="1530456" cy="242225"/>
           </a:xfrm>
           <a:prstGeom prst="rightArrow">
@@ -9501,46 +10493,17 @@
             <a:pPr algn="ctr"/>
             <a:r>
               <a:rPr lang="en-IL" sz="1000" dirty="0"/>
-              <a:t>Terpenes</a:t>
-            </a:r>
-          </a:p>
-        </p:txBody>
-      </p:sp>
-      <p:pic>
-        <p:nvPicPr>
-          <p:cNvPr id="13" name="Picture 12" descr="Map&#10;&#10;Description automatically generated with low confidence">
-            <a:extLst>
-              <a:ext uri="{FF2B5EF4-FFF2-40B4-BE49-F238E27FC236}">
-                <a16:creationId xmlns:a16="http://schemas.microsoft.com/office/drawing/2014/main" id="{C06520F3-2086-1942-803E-D2422FC8A686}"/>
-              </a:ext>
-            </a:extLst>
-          </p:cNvPr>
-          <p:cNvPicPr>
-            <a:picLocks noChangeAspect="1"/>
-          </p:cNvPicPr>
-          <p:nvPr/>
-        </p:nvPicPr>
-        <p:blipFill rotWithShape="1">
-          <a:blip r:embed="rId2"/>
-          <a:srcRect l="20853" t="9187" r="21410" b="32619"/>
-          <a:stretch/>
-        </p:blipFill>
-        <p:spPr>
-          <a:xfrm>
-            <a:off x="8220939" y="4719077"/>
-            <a:ext cx="1379901" cy="1390824"/>
-          </a:xfrm>
-          <a:prstGeom prst="rect">
-            <a:avLst/>
-          </a:prstGeom>
-        </p:spPr>
-      </p:pic>
-      <p:sp>
-        <p:nvSpPr>
-          <p:cNvPr id="18" name="Right Arrow 17">
-            <a:extLst>
-              <a:ext uri="{FF2B5EF4-FFF2-40B4-BE49-F238E27FC236}">
-                <a16:creationId xmlns:a16="http://schemas.microsoft.com/office/drawing/2014/main" id="{69FA3600-00E5-AA4D-ABFF-12742C362001}"/>
+              <a:t>Feelings</a:t>
+            </a:r>
+          </a:p>
+        </p:txBody>
+      </p:sp>
+      <p:sp>
+        <p:nvSpPr>
+          <p:cNvPr id="10" name="Right Arrow 9">
+            <a:extLst>
+              <a:ext uri="{FF2B5EF4-FFF2-40B4-BE49-F238E27FC236}">
+                <a16:creationId xmlns:a16="http://schemas.microsoft.com/office/drawing/2014/main" id="{511C89C4-CD92-5F4B-90AB-86079802D699}"/>
               </a:ext>
             </a:extLst>
           </p:cNvPr>
@@ -9549,7 +10512,7 @@
         </p:nvSpPr>
         <p:spPr>
           <a:xfrm>
-            <a:off x="6592143" y="5267174"/>
+            <a:off x="3022211" y="5755042"/>
             <a:ext cx="1530456" cy="242225"/>
           </a:xfrm>
           <a:prstGeom prst="rightArrow">
@@ -9584,6 +10547,197 @@
             <a:pPr algn="ctr"/>
             <a:r>
               <a:rPr lang="en-IL" sz="1000" dirty="0"/>
+              <a:t>Flavors</a:t>
+            </a:r>
+          </a:p>
+        </p:txBody>
+      </p:sp>
+      <p:sp>
+        <p:nvSpPr>
+          <p:cNvPr id="11" name="Right Arrow 10">
+            <a:extLst>
+              <a:ext uri="{FF2B5EF4-FFF2-40B4-BE49-F238E27FC236}">
+                <a16:creationId xmlns:a16="http://schemas.microsoft.com/office/drawing/2014/main" id="{51BD266D-FC42-2D4E-AFF9-61FDF41879D3}"/>
+              </a:ext>
+            </a:extLst>
+          </p:cNvPr>
+          <p:cNvSpPr/>
+          <p:nvPr/>
+        </p:nvSpPr>
+        <p:spPr>
+          <a:xfrm>
+            <a:off x="3022211" y="5414489"/>
+            <a:ext cx="1530456" cy="242225"/>
+          </a:xfrm>
+          <a:prstGeom prst="rightArrow">
+            <a:avLst/>
+          </a:prstGeom>
+          <a:solidFill>
+            <a:schemeClr val="tx1">
+              <a:lumMod val="50000"/>
+            </a:schemeClr>
+          </a:solidFill>
+        </p:spPr>
+        <p:style>
+          <a:lnRef idx="2">
+            <a:schemeClr val="accent1">
+              <a:shade val="50000"/>
+            </a:schemeClr>
+          </a:lnRef>
+          <a:fillRef idx="1">
+            <a:schemeClr val="accent1"/>
+          </a:fillRef>
+          <a:effectRef idx="0">
+            <a:schemeClr val="accent1"/>
+          </a:effectRef>
+          <a:fontRef idx="minor">
+            <a:schemeClr val="lt1"/>
+          </a:fontRef>
+        </p:style>
+        <p:txBody>
+          <a:bodyPr rtlCol="0" anchor="ctr"/>
+          <a:lstStyle/>
+          <a:p>
+            <a:pPr algn="ctr"/>
+            <a:r>
+              <a:rPr lang="en-IL" sz="1000" dirty="0"/>
+              <a:t>THC %</a:t>
+            </a:r>
+          </a:p>
+        </p:txBody>
+      </p:sp>
+      <p:sp>
+        <p:nvSpPr>
+          <p:cNvPr id="12" name="Right Arrow 11">
+            <a:extLst>
+              <a:ext uri="{FF2B5EF4-FFF2-40B4-BE49-F238E27FC236}">
+                <a16:creationId xmlns:a16="http://schemas.microsoft.com/office/drawing/2014/main" id="{02173687-FB0B-5640-AC14-5F44C3F173AE}"/>
+              </a:ext>
+            </a:extLst>
+          </p:cNvPr>
+          <p:cNvSpPr/>
+          <p:nvPr/>
+        </p:nvSpPr>
+        <p:spPr>
+          <a:xfrm>
+            <a:off x="3029481" y="5092106"/>
+            <a:ext cx="1530456" cy="242225"/>
+          </a:xfrm>
+          <a:prstGeom prst="rightArrow">
+            <a:avLst/>
+          </a:prstGeom>
+          <a:solidFill>
+            <a:schemeClr val="tx1">
+              <a:lumMod val="50000"/>
+            </a:schemeClr>
+          </a:solidFill>
+        </p:spPr>
+        <p:style>
+          <a:lnRef idx="2">
+            <a:schemeClr val="accent1">
+              <a:shade val="50000"/>
+            </a:schemeClr>
+          </a:lnRef>
+          <a:fillRef idx="1">
+            <a:schemeClr val="accent1"/>
+          </a:fillRef>
+          <a:effectRef idx="0">
+            <a:schemeClr val="accent1"/>
+          </a:effectRef>
+          <a:fontRef idx="minor">
+            <a:schemeClr val="lt1"/>
+          </a:fontRef>
+        </p:style>
+        <p:txBody>
+          <a:bodyPr rtlCol="0" anchor="ctr"/>
+          <a:lstStyle/>
+          <a:p>
+            <a:pPr algn="ctr"/>
+            <a:r>
+              <a:rPr lang="en-IL" sz="1000" dirty="0"/>
+              <a:t>Terpenes</a:t>
+            </a:r>
+          </a:p>
+        </p:txBody>
+      </p:sp>
+      <p:pic>
+        <p:nvPicPr>
+          <p:cNvPr id="13" name="Picture 12" descr="Map&#10;&#10;Description automatically generated with low confidence">
+            <a:extLst>
+              <a:ext uri="{FF2B5EF4-FFF2-40B4-BE49-F238E27FC236}">
+                <a16:creationId xmlns:a16="http://schemas.microsoft.com/office/drawing/2014/main" id="{C06520F3-2086-1942-803E-D2422FC8A686}"/>
+              </a:ext>
+            </a:extLst>
+          </p:cNvPr>
+          <p:cNvPicPr>
+            <a:picLocks noChangeAspect="1"/>
+          </p:cNvPicPr>
+          <p:nvPr/>
+        </p:nvPicPr>
+        <p:blipFill rotWithShape="1">
+          <a:blip r:embed="rId2"/>
+          <a:srcRect l="20853" t="9187" r="21410" b="32619"/>
+          <a:stretch/>
+        </p:blipFill>
+        <p:spPr>
+          <a:xfrm>
+            <a:off x="8220939" y="4719077"/>
+            <a:ext cx="1379901" cy="1390824"/>
+          </a:xfrm>
+          <a:prstGeom prst="rect">
+            <a:avLst/>
+          </a:prstGeom>
+        </p:spPr>
+      </p:pic>
+      <p:sp>
+        <p:nvSpPr>
+          <p:cNvPr id="18" name="Right Arrow 17">
+            <a:extLst>
+              <a:ext uri="{FF2B5EF4-FFF2-40B4-BE49-F238E27FC236}">
+                <a16:creationId xmlns:a16="http://schemas.microsoft.com/office/drawing/2014/main" id="{69FA3600-00E5-AA4D-ABFF-12742C362001}"/>
+              </a:ext>
+            </a:extLst>
+          </p:cNvPr>
+          <p:cNvSpPr/>
+          <p:nvPr/>
+        </p:nvSpPr>
+        <p:spPr>
+          <a:xfrm>
+            <a:off x="6592143" y="5267174"/>
+            <a:ext cx="1530456" cy="242225"/>
+          </a:xfrm>
+          <a:prstGeom prst="rightArrow">
+            <a:avLst/>
+          </a:prstGeom>
+          <a:solidFill>
+            <a:schemeClr val="tx1">
+              <a:lumMod val="50000"/>
+            </a:schemeClr>
+          </a:solidFill>
+        </p:spPr>
+        <p:style>
+          <a:lnRef idx="2">
+            <a:schemeClr val="accent1">
+              <a:shade val="50000"/>
+            </a:schemeClr>
+          </a:lnRef>
+          <a:fillRef idx="1">
+            <a:schemeClr val="accent1"/>
+          </a:fillRef>
+          <a:effectRef idx="0">
+            <a:schemeClr val="accent1"/>
+          </a:effectRef>
+          <a:fontRef idx="minor">
+            <a:schemeClr val="lt1"/>
+          </a:fontRef>
+        </p:style>
+        <p:txBody>
+          <a:bodyPr rtlCol="0" anchor="ctr"/>
+          <a:lstStyle/>
+          <a:p>
+            <a:pPr algn="ctr"/>
+            <a:r>
+              <a:rPr lang="en-IL" sz="1000" dirty="0"/>
               <a:t>Indica / Sativa / Hybrid</a:t>
             </a:r>
           </a:p>
@@ -9602,7 +10756,7 @@
 </p:sld>
 </file>
 
-<file path=ppt/slides/slide14.xml><?xml version="1.0" encoding="utf-8"?>
+<file path=ppt/slides/slide15.xml><?xml version="1.0" encoding="utf-8"?>
 <p:sld xmlns:a="http://schemas.openxmlformats.org/drawingml/2006/main" xmlns:r="http://schemas.openxmlformats.org/officeDocument/2006/relationships" xmlns:p="http://schemas.openxmlformats.org/presentationml/2006/main">
   <p:cSld>
     <p:bg>
@@ -10406,7 +11560,7 @@
 </p:sld>
 </file>
 
-<file path=ppt/slides/slide15.xml><?xml version="1.0" encoding="utf-8"?>
+<file path=ppt/slides/slide16.xml><?xml version="1.0" encoding="utf-8"?>
 <p:sld xmlns:a="http://schemas.openxmlformats.org/drawingml/2006/main" xmlns:r="http://schemas.openxmlformats.org/officeDocument/2006/relationships" xmlns:p="http://schemas.openxmlformats.org/presentationml/2006/main">
   <p:cSld>
     <p:bg>
@@ -16607,4 +17761,299 @@
     </a:ext>
   </a:extLst>
 </a:theme>
+</file>
+
+<file path=ppt/theme/theme2.xml><?xml version="1.0" encoding="utf-8"?>
+<a:theme xmlns:a="http://schemas.openxmlformats.org/drawingml/2006/main" name="Office Theme">
+  <a:themeElements>
+    <a:clrScheme name="Office">
+      <a:dk1>
+        <a:sysClr val="windowText" lastClr="000000"/>
+      </a:dk1>
+      <a:lt1>
+        <a:sysClr val="window" lastClr="FFFFFF"/>
+      </a:lt1>
+      <a:dk2>
+        <a:srgbClr val="44546A"/>
+      </a:dk2>
+      <a:lt2>
+        <a:srgbClr val="E7E6E6"/>
+      </a:lt2>
+      <a:accent1>
+        <a:srgbClr val="4472C4"/>
+      </a:accent1>
+      <a:accent2>
+        <a:srgbClr val="ED7D31"/>
+      </a:accent2>
+      <a:accent3>
+        <a:srgbClr val="A5A5A5"/>
+      </a:accent3>
+      <a:accent4>
+        <a:srgbClr val="FFC000"/>
+      </a:accent4>
+      <a:accent5>
+        <a:srgbClr val="5B9BD5"/>
+      </a:accent5>
+      <a:accent6>
+        <a:srgbClr val="70AD47"/>
+      </a:accent6>
+      <a:hlink>
+        <a:srgbClr val="0563C1"/>
+      </a:hlink>
+      <a:folHlink>
+        <a:srgbClr val="954F72"/>
+      </a:folHlink>
+    </a:clrScheme>
+    <a:fontScheme name="Office">
+      <a:majorFont>
+        <a:latin typeface="Calibri Light" panose="020F0302020204030204"/>
+        <a:ea typeface=""/>
+        <a:cs typeface=""/>
+        <a:font script="Jpan" typeface="游ゴシック Light"/>
+        <a:font script="Hang" typeface="맑은 고딕"/>
+        <a:font script="Hans" typeface="等线 Light"/>
+        <a:font script="Hant" typeface="新細明體"/>
+        <a:font script="Arab" typeface="Times New Roman"/>
+        <a:font script="Hebr" typeface="Times New Roman"/>
+        <a:font script="Thai" typeface="Angsana New"/>
+        <a:font script="Ethi" typeface="Nyala"/>
+        <a:font script="Beng" typeface="Vrinda"/>
+        <a:font script="Gujr" typeface="Shruti"/>
+        <a:font script="Khmr" typeface="MoolBoran"/>
+        <a:font script="Knda" typeface="Tunga"/>
+        <a:font script="Guru" typeface="Raavi"/>
+        <a:font script="Cans" typeface="Euphemia"/>
+        <a:font script="Cher" typeface="Plantagenet Cherokee"/>
+        <a:font script="Yiii" typeface="Microsoft Yi Baiti"/>
+        <a:font script="Tibt" typeface="Microsoft Himalaya"/>
+        <a:font script="Thaa" typeface="MV Boli"/>
+        <a:font script="Deva" typeface="Mangal"/>
+        <a:font script="Telu" typeface="Gautami"/>
+        <a:font script="Taml" typeface="Latha"/>
+        <a:font script="Syrc" typeface="Estrangelo Edessa"/>
+        <a:font script="Orya" typeface="Kalinga"/>
+        <a:font script="Mlym" typeface="Kartika"/>
+        <a:font script="Laoo" typeface="DokChampa"/>
+        <a:font script="Sinh" typeface="Iskoola Pota"/>
+        <a:font script="Mong" typeface="Mongolian Baiti"/>
+        <a:font script="Viet" typeface="Times New Roman"/>
+        <a:font script="Uigh" typeface="Microsoft Uighur"/>
+        <a:font script="Geor" typeface="Sylfaen"/>
+        <a:font script="Armn" typeface="Arial"/>
+        <a:font script="Bugi" typeface="Leelawadee UI"/>
+        <a:font script="Bopo" typeface="Microsoft JhengHei"/>
+        <a:font script="Java" typeface="Javanese Text"/>
+        <a:font script="Lisu" typeface="Segoe UI"/>
+        <a:font script="Mymr" typeface="Myanmar Text"/>
+        <a:font script="Nkoo" typeface="Ebrima"/>
+        <a:font script="Olck" typeface="Nirmala UI"/>
+        <a:font script="Osma" typeface="Ebrima"/>
+        <a:font script="Phag" typeface="Phagspa"/>
+        <a:font script="Syrn" typeface="Estrangelo Edessa"/>
+        <a:font script="Syrj" typeface="Estrangelo Edessa"/>
+        <a:font script="Syre" typeface="Estrangelo Edessa"/>
+        <a:font script="Sora" typeface="Nirmala UI"/>
+        <a:font script="Tale" typeface="Microsoft Tai Le"/>
+        <a:font script="Talu" typeface="Microsoft New Tai Lue"/>
+        <a:font script="Tfng" typeface="Ebrima"/>
+      </a:majorFont>
+      <a:minorFont>
+        <a:latin typeface="Calibri" panose="020F0502020204030204"/>
+        <a:ea typeface=""/>
+        <a:cs typeface=""/>
+        <a:font script="Jpan" typeface="游ゴシック"/>
+        <a:font script="Hang" typeface="맑은 고딕"/>
+        <a:font script="Hans" typeface="等线"/>
+        <a:font script="Hant" typeface="新細明體"/>
+        <a:font script="Arab" typeface="Arial"/>
+        <a:font script="Hebr" typeface="Arial"/>
+        <a:font script="Thai" typeface="Cordia New"/>
+        <a:font script="Ethi" typeface="Nyala"/>
+        <a:font script="Beng" typeface="Vrinda"/>
+        <a:font script="Gujr" typeface="Shruti"/>
+        <a:font script="Khmr" typeface="DaunPenh"/>
+        <a:font script="Knda" typeface="Tunga"/>
+        <a:font script="Guru" typeface="Raavi"/>
+        <a:font script="Cans" typeface="Euphemia"/>
+        <a:font script="Cher" typeface="Plantagenet Cherokee"/>
+        <a:font script="Yiii" typeface="Microsoft Yi Baiti"/>
+        <a:font script="Tibt" typeface="Microsoft Himalaya"/>
+        <a:font script="Thaa" typeface="MV Boli"/>
+        <a:font script="Deva" typeface="Mangal"/>
+        <a:font script="Telu" typeface="Gautami"/>
+        <a:font script="Taml" typeface="Latha"/>
+        <a:font script="Syrc" typeface="Estrangelo Edessa"/>
+        <a:font script="Orya" typeface="Kalinga"/>
+        <a:font script="Mlym" typeface="Kartika"/>
+        <a:font script="Laoo" typeface="DokChampa"/>
+        <a:font script="Sinh" typeface="Iskoola Pota"/>
+        <a:font script="Mong" typeface="Mongolian Baiti"/>
+        <a:font script="Viet" typeface="Arial"/>
+        <a:font script="Uigh" typeface="Microsoft Uighur"/>
+        <a:font script="Geor" typeface="Sylfaen"/>
+        <a:font script="Armn" typeface="Arial"/>
+        <a:font script="Bugi" typeface="Leelawadee UI"/>
+        <a:font script="Bopo" typeface="Microsoft JhengHei"/>
+        <a:font script="Java" typeface="Javanese Text"/>
+        <a:font script="Lisu" typeface="Segoe UI"/>
+        <a:font script="Mymr" typeface="Myanmar Text"/>
+        <a:font script="Nkoo" typeface="Ebrima"/>
+        <a:font script="Olck" typeface="Nirmala UI"/>
+        <a:font script="Osma" typeface="Ebrima"/>
+        <a:font script="Phag" typeface="Phagspa"/>
+        <a:font script="Syrn" typeface="Estrangelo Edessa"/>
+        <a:font script="Syrj" typeface="Estrangelo Edessa"/>
+        <a:font script="Syre" typeface="Estrangelo Edessa"/>
+        <a:font script="Sora" typeface="Nirmala UI"/>
+        <a:font script="Tale" typeface="Microsoft Tai Le"/>
+        <a:font script="Talu" typeface="Microsoft New Tai Lue"/>
+        <a:font script="Tfng" typeface="Ebrima"/>
+      </a:minorFont>
+    </a:fontScheme>
+    <a:fmtScheme name="Office">
+      <a:fillStyleLst>
+        <a:solidFill>
+          <a:schemeClr val="phClr"/>
+        </a:solidFill>
+        <a:gradFill rotWithShape="1">
+          <a:gsLst>
+            <a:gs pos="0">
+              <a:schemeClr val="phClr">
+                <a:lumMod val="110000"/>
+                <a:satMod val="105000"/>
+                <a:tint val="67000"/>
+              </a:schemeClr>
+            </a:gs>
+            <a:gs pos="50000">
+              <a:schemeClr val="phClr">
+                <a:lumMod val="105000"/>
+                <a:satMod val="103000"/>
+                <a:tint val="73000"/>
+              </a:schemeClr>
+            </a:gs>
+            <a:gs pos="100000">
+              <a:schemeClr val="phClr">
+                <a:lumMod val="105000"/>
+                <a:satMod val="109000"/>
+                <a:tint val="81000"/>
+              </a:schemeClr>
+            </a:gs>
+          </a:gsLst>
+          <a:lin ang="5400000" scaled="0"/>
+        </a:gradFill>
+        <a:gradFill rotWithShape="1">
+          <a:gsLst>
+            <a:gs pos="0">
+              <a:schemeClr val="phClr">
+                <a:satMod val="103000"/>
+                <a:lumMod val="102000"/>
+                <a:tint val="94000"/>
+              </a:schemeClr>
+            </a:gs>
+            <a:gs pos="50000">
+              <a:schemeClr val="phClr">
+                <a:satMod val="110000"/>
+                <a:lumMod val="100000"/>
+                <a:shade val="100000"/>
+              </a:schemeClr>
+            </a:gs>
+            <a:gs pos="100000">
+              <a:schemeClr val="phClr">
+                <a:lumMod val="99000"/>
+                <a:satMod val="120000"/>
+                <a:shade val="78000"/>
+              </a:schemeClr>
+            </a:gs>
+          </a:gsLst>
+          <a:lin ang="5400000" scaled="0"/>
+        </a:gradFill>
+      </a:fillStyleLst>
+      <a:lnStyleLst>
+        <a:ln w="6350" cap="flat" cmpd="sng" algn="ctr">
+          <a:solidFill>
+            <a:schemeClr val="phClr"/>
+          </a:solidFill>
+          <a:prstDash val="solid"/>
+          <a:miter lim="800000"/>
+        </a:ln>
+        <a:ln w="12700" cap="flat" cmpd="sng" algn="ctr">
+          <a:solidFill>
+            <a:schemeClr val="phClr"/>
+          </a:solidFill>
+          <a:prstDash val="solid"/>
+          <a:miter lim="800000"/>
+        </a:ln>
+        <a:ln w="19050" cap="flat" cmpd="sng" algn="ctr">
+          <a:solidFill>
+            <a:schemeClr val="phClr"/>
+          </a:solidFill>
+          <a:prstDash val="solid"/>
+          <a:miter lim="800000"/>
+        </a:ln>
+      </a:lnStyleLst>
+      <a:effectStyleLst>
+        <a:effectStyle>
+          <a:effectLst/>
+        </a:effectStyle>
+        <a:effectStyle>
+          <a:effectLst/>
+        </a:effectStyle>
+        <a:effectStyle>
+          <a:effectLst>
+            <a:outerShdw blurRad="57150" dist="19050" dir="5400000" algn="ctr" rotWithShape="0">
+              <a:srgbClr val="000000">
+                <a:alpha val="63000"/>
+              </a:srgbClr>
+            </a:outerShdw>
+          </a:effectLst>
+        </a:effectStyle>
+      </a:effectStyleLst>
+      <a:bgFillStyleLst>
+        <a:solidFill>
+          <a:schemeClr val="phClr"/>
+        </a:solidFill>
+        <a:solidFill>
+          <a:schemeClr val="phClr">
+            <a:tint val="95000"/>
+            <a:satMod val="170000"/>
+          </a:schemeClr>
+        </a:solidFill>
+        <a:gradFill rotWithShape="1">
+          <a:gsLst>
+            <a:gs pos="0">
+              <a:schemeClr val="phClr">
+                <a:tint val="93000"/>
+                <a:satMod val="150000"/>
+                <a:shade val="98000"/>
+                <a:lumMod val="102000"/>
+              </a:schemeClr>
+            </a:gs>
+            <a:gs pos="50000">
+              <a:schemeClr val="phClr">
+                <a:tint val="98000"/>
+                <a:satMod val="130000"/>
+                <a:shade val="90000"/>
+                <a:lumMod val="103000"/>
+              </a:schemeClr>
+            </a:gs>
+            <a:gs pos="100000">
+              <a:schemeClr val="phClr">
+                <a:shade val="63000"/>
+                <a:satMod val="120000"/>
+              </a:schemeClr>
+            </a:gs>
+          </a:gsLst>
+          <a:lin ang="5400000" scaled="0"/>
+        </a:gradFill>
+      </a:bgFillStyleLst>
+    </a:fmtScheme>
+  </a:themeElements>
+  <a:objectDefaults/>
+  <a:extraClrSchemeLst/>
+  <a:extLst>
+    <a:ext uri="{05A4C25C-085E-4340-85A3-A5531E510DB2}">
+      <thm15:themeFamily xmlns:thm15="http://schemas.microsoft.com/office/thememl/2012/main" name="Office Theme" id="{62F939B6-93AF-4DB8-9C6B-D6C7DFDC589F}" vid="{4A3C46E8-61CC-4603-A589-7422A47A8E4A}"/>
+    </a:ext>
+  </a:extLst>
+</a:theme>
 </file>
</xml_diff>